<commit_message>
jornada de usuario e mapa de empatia
</commit_message>
<xml_diff>
--- a/Documentação/Entregavel-do-projeto-jornada1.pptx.pptx
+++ b/Documentação/Entregavel-do-projeto-jornada1.pptx.pptx
@@ -3,7 +3,7 @@
 <p:presentation xmlns:a="http://schemas.openxmlformats.org/drawingml/2006/main" xmlns:r="http://schemas.openxmlformats.org/officeDocument/2006/relationships" xmlns:p="http://schemas.openxmlformats.org/presentationml/2006/main">
   <p:sldMasterIdLst>
     <p:sldMasterId id="2147483648" r:id="rId1"/>
-    <p:sldMasterId id="2147483652" r:id="rId3"/>
+    <p:sldMasterId id="2147483653" r:id="rId3"/>
   </p:sldMasterIdLst>
   <p:notesMasterIdLst>
     <p:notesMasterId r:id="rId22"/>
@@ -18,8 +18,8 @@
     <p:sldId id="624" r:id="rId7"/>
     <p:sldId id="631" r:id="rId8"/>
     <p:sldId id="630" r:id="rId9"/>
-    <p:sldId id="632" r:id="rId10"/>
-    <p:sldId id="649" r:id="rId11"/>
+    <p:sldId id="650" r:id="rId10"/>
+    <p:sldId id="651" r:id="rId11"/>
     <p:sldId id="633" r:id="rId12"/>
     <p:sldId id="623" r:id="rId13"/>
     <p:sldId id="601" r:id="rId14"/>
@@ -4451,6 +4451,206 @@
 </file>
 
 <file path=ppt/slideLayouts/slideLayout4.xml><?xml version="1.0" encoding="utf-8"?>
+<p:sldLayout xmlns:a="http://schemas.openxmlformats.org/drawingml/2006/main" xmlns:r="http://schemas.openxmlformats.org/officeDocument/2006/relationships" xmlns:p="http://schemas.openxmlformats.org/presentationml/2006/main" type="obj" preserve="1">
+  <p:cSld name="Title and Content">
+    <p:spTree>
+      <p:nvGrpSpPr>
+        <p:cNvPr id="1" name=""/>
+        <p:cNvGrpSpPr/>
+        <p:nvPr/>
+      </p:nvGrpSpPr>
+      <p:grpSpPr>
+        <a:xfrm>
+          <a:off x="0" y="0"/>
+          <a:ext cx="0" cy="0"/>
+          <a:chOff x="0" y="0"/>
+          <a:chExt cx="0" cy="0"/>
+        </a:xfrm>
+      </p:grpSpPr>
+      <p:sp>
+        <p:nvSpPr>
+          <p:cNvPr id="2" name="Holder 2"/>
+          <p:cNvSpPr>
+            <a:spLocks noGrp="1"/>
+          </p:cNvSpPr>
+          <p:nvPr>
+            <p:ph type="title"/>
+          </p:nvPr>
+        </p:nvSpPr>
+        <p:spPr>
+          <a:xfrm>
+            <a:off x="2951814" y="146012"/>
+            <a:ext cx="7539322" cy="599924"/>
+          </a:xfrm>
+        </p:spPr>
+        <p:txBody>
+          <a:bodyPr lIns="0" tIns="0" rIns="0" bIns="0"/>
+          <a:lstStyle>
+            <a:lvl1pPr>
+              <a:defRPr sz="3750" b="1" i="0">
+                <a:solidFill>
+                  <a:srgbClr val="31B8CD"/>
+                </a:solidFill>
+                <a:latin typeface="Arial" panose="020B0604020202020204"/>
+                <a:cs typeface="Arial" panose="020B0604020202020204"/>
+              </a:defRPr>
+            </a:lvl1pPr>
+          </a:lstStyle>
+          <a:p/>
+        </p:txBody>
+      </p:sp>
+      <p:sp>
+        <p:nvSpPr>
+          <p:cNvPr id="3" name="Holder 3"/>
+          <p:cNvSpPr>
+            <a:spLocks noGrp="1"/>
+          </p:cNvSpPr>
+          <p:nvPr>
+            <p:ph type="body" idx="1"/>
+          </p:nvPr>
+        </p:nvSpPr>
+        <p:spPr>
+          <a:xfrm>
+            <a:off x="6926101" y="1592051"/>
+            <a:ext cx="6151513" cy="5255841"/>
+          </a:xfrm>
+        </p:spPr>
+        <p:txBody>
+          <a:bodyPr lIns="0" tIns="0" rIns="0" bIns="0"/>
+          <a:lstStyle>
+            <a:lvl1pPr>
+              <a:defRPr sz="2400" b="0" i="0">
+                <a:solidFill>
+                  <a:schemeClr val="tx1"/>
+                </a:solidFill>
+                <a:latin typeface="Arial" panose="020B0604020202020204"/>
+                <a:cs typeface="Arial" panose="020B0604020202020204"/>
+              </a:defRPr>
+            </a:lvl1pPr>
+          </a:lstStyle>
+          <a:p/>
+        </p:txBody>
+      </p:sp>
+      <p:sp>
+        <p:nvSpPr>
+          <p:cNvPr id="4" name="Holder 4"/>
+          <p:cNvSpPr>
+            <a:spLocks noGrp="1"/>
+          </p:cNvSpPr>
+          <p:nvPr>
+            <p:ph type="ftr" sz="quarter" idx="5"/>
+          </p:nvPr>
+        </p:nvSpPr>
+        <p:spPr>
+          <a:xfrm>
+            <a:off x="4570603" y="7031678"/>
+            <a:ext cx="4301744" cy="378047"/>
+          </a:xfrm>
+        </p:spPr>
+        <p:txBody>
+          <a:bodyPr lIns="0" tIns="0" rIns="0" bIns="0"/>
+          <a:lstStyle>
+            <a:lvl1pPr algn="ctr">
+              <a:defRPr>
+                <a:solidFill>
+                  <a:schemeClr val="tx1">
+                    <a:tint val="75000"/>
+                  </a:schemeClr>
+                </a:solidFill>
+              </a:defRPr>
+            </a:lvl1pPr>
+          </a:lstStyle>
+          <a:p/>
+        </p:txBody>
+      </p:sp>
+      <p:sp>
+        <p:nvSpPr>
+          <p:cNvPr id="5" name="Holder 5"/>
+          <p:cNvSpPr>
+            <a:spLocks noGrp="1"/>
+          </p:cNvSpPr>
+          <p:nvPr>
+            <p:ph type="dt" sz="half" idx="6"/>
+          </p:nvPr>
+        </p:nvSpPr>
+        <p:spPr>
+          <a:xfrm>
+            <a:off x="672148" y="7031678"/>
+            <a:ext cx="3091879" cy="378047"/>
+          </a:xfrm>
+        </p:spPr>
+        <p:txBody>
+          <a:bodyPr lIns="0" tIns="0" rIns="0" bIns="0"/>
+          <a:lstStyle>
+            <a:lvl1pPr algn="l">
+              <a:defRPr>
+                <a:solidFill>
+                  <a:schemeClr val="tx1">
+                    <a:tint val="75000"/>
+                  </a:schemeClr>
+                </a:solidFill>
+              </a:defRPr>
+            </a:lvl1pPr>
+          </a:lstStyle>
+          <a:p>
+            <a:fld id="{1D8BD707-D9CF-40AE-B4C6-C98DA3205C09}" type="datetimeFigureOut">
+              <a:rPr lang="en-US"/>
+            </a:fld>
+            <a:endParaRPr lang="en-US"/>
+          </a:p>
+        </p:txBody>
+      </p:sp>
+      <p:sp>
+        <p:nvSpPr>
+          <p:cNvPr id="6" name="Holder 6"/>
+          <p:cNvSpPr>
+            <a:spLocks noGrp="1"/>
+          </p:cNvSpPr>
+          <p:nvPr>
+            <p:ph type="sldNum" sz="quarter" idx="7"/>
+          </p:nvPr>
+        </p:nvSpPr>
+        <p:spPr>
+          <a:xfrm>
+            <a:off x="12980011" y="7251518"/>
+            <a:ext cx="287519" cy="204418"/>
+          </a:xfrm>
+        </p:spPr>
+        <p:txBody>
+          <a:bodyPr lIns="0" tIns="0" rIns="0" bIns="0"/>
+          <a:lstStyle>
+            <a:lvl1pPr>
+              <a:defRPr sz="1250" b="1" i="0">
+                <a:solidFill>
+                  <a:schemeClr val="bg1"/>
+                </a:solidFill>
+                <a:latin typeface="Arial" panose="020B0604020202020204"/>
+                <a:cs typeface="Arial" panose="020B0604020202020204"/>
+              </a:defRPr>
+            </a:lvl1pPr>
+          </a:lstStyle>
+          <a:p>
+            <a:pPr marL="38100">
+              <a:lnSpc>
+                <a:spcPts val="1490"/>
+              </a:lnSpc>
+            </a:pPr>
+            <a:fld id="{81D60167-4931-47E6-BA6A-407CBD079E47}" type="slidenum">
+              <a:rPr spc="5" dirty="0"/>
+            </a:fld>
+            <a:endParaRPr spc="5" dirty="0"/>
+          </a:p>
+        </p:txBody>
+      </p:sp>
+    </p:spTree>
+  </p:cSld>
+  <p:clrMapOvr>
+    <a:masterClrMapping/>
+  </p:clrMapOvr>
+</p:sldLayout>
+</file>
+
+<file path=ppt/slideLayouts/slideLayout5.xml><?xml version="1.0" encoding="utf-8"?>
 <p:sldLayout xmlns:a="http://schemas.openxmlformats.org/drawingml/2006/main" xmlns:r="http://schemas.openxmlformats.org/officeDocument/2006/relationships" xmlns:p="http://schemas.openxmlformats.org/presentationml/2006/main" preserve="1">
   <p:cSld name="Encerramento 1">
     <p:spTree>
@@ -6505,7 +6705,7 @@
 </p:sldLayout>
 </file>
 
-<file path=ppt/slideLayouts/slideLayout5.xml><?xml version="1.0" encoding="utf-8"?>
+<file path=ppt/slideLayouts/slideLayout6.xml><?xml version="1.0" encoding="utf-8"?>
 <p:sldLayout xmlns:a="http://schemas.openxmlformats.org/drawingml/2006/main" xmlns:r="http://schemas.openxmlformats.org/officeDocument/2006/relationships" xmlns:p="http://schemas.openxmlformats.org/presentationml/2006/main" preserve="1" userDrawn="1">
   <p:cSld name="Encerramento 2">
     <p:spTree>
@@ -8542,6 +8742,7 @@
     <p:sldLayoutId id="2147483649" r:id="rId1"/>
     <p:sldLayoutId id="2147483650" r:id="rId2"/>
     <p:sldLayoutId id="2147483651" r:id="rId3"/>
+    <p:sldLayoutId id="2147483652" r:id="rId4"/>
   </p:sldLayoutIdLst>
   <p:txStyles>
     <p:titleStyle>
@@ -8822,8 +9023,8 @@
   </p:cSld>
   <p:clrMap bg1="lt1" tx1="dk1" bg2="lt2" tx2="dk2" accent1="accent1" accent2="accent2" accent3="accent3" accent4="accent4" accent5="accent5" accent6="accent6" hlink="hlink" folHlink="folHlink"/>
   <p:sldLayoutIdLst>
-    <p:sldLayoutId id="2147483653" r:id="rId1"/>
-    <p:sldLayoutId id="2147483654" r:id="rId2"/>
+    <p:sldLayoutId id="2147483654" r:id="rId1"/>
+    <p:sldLayoutId id="2147483655" r:id="rId2"/>
   </p:sldLayoutIdLst>
   <p:txStyles>
     <p:titleStyle>
@@ -9381,7 +9582,7 @@
             <a:pPr lvl="1"/>
             <a:r>
               <a:rPr lang="pt-PT" altLang="pt-BR" sz="3200" dirty="0"/>
-              <a:t>Fizemos uma pesquisa de campo entre as domésticas, entrevistando-as.</a:t>
+              <a:t>Fizemos uma pesquisa de campo entre as domésticas, entrevistando-as,  fizemos testes de serviço em sites concorrentes, analisando e idealizando o que poderiamos melhorar e inovar.</a:t>
             </a:r>
             <a:endParaRPr lang="pt-PT" altLang="pt-BR" sz="3200" dirty="0"/>
           </a:p>
@@ -15528,7 +15729,7 @@
         </p:nvSpPr>
         <p:spPr>
           <a:xfrm>
-            <a:off x="610094" y="1278571"/>
+            <a:off x="497064" y="1263331"/>
             <a:ext cx="12448085" cy="3312368"/>
           </a:xfrm>
         </p:spPr>
@@ -15550,31 +15751,75 @@
             </a:endParaRPr>
           </a:p>
           <a:p>
-            <a:endParaRPr lang="pt-BR" sz="2400" dirty="0">
+            <a:r>
+              <a:rPr lang="pt-BR" sz="3200" dirty="0">
+                <a:solidFill>
+                  <a:srgbClr val="253746"/>
+                </a:solidFill>
+              </a:rPr>
+              <a:t>https://blumpa.com/</a:t>
+            </a:r>
+            <a:endParaRPr lang="pt-BR" sz="3200" dirty="0">
               <a:solidFill>
                 <a:srgbClr val="253746"/>
               </a:solidFill>
             </a:endParaRPr>
           </a:p>
           <a:p>
-            <a:endParaRPr lang="pt-BR" sz="2400" dirty="0">
+            <a:r>
+              <a:rPr lang="pt-BR" sz="3200" dirty="0">
+                <a:solidFill>
+                  <a:srgbClr val="253746"/>
+                </a:solidFill>
+              </a:rPr>
+              <a:t>https://www.getninjas.com.br/familia/diarista/</a:t>
+            </a:r>
+            <a:endParaRPr lang="pt-BR" sz="3200" dirty="0">
               <a:solidFill>
                 <a:srgbClr val="253746"/>
               </a:solidFill>
             </a:endParaRPr>
           </a:p>
           <a:p>
-            <a:pPr marL="0" indent="0">
-              <a:buNone/>
-            </a:pPr>
-            <a:endParaRPr lang="pt-BR" sz="2400" dirty="0">
+            <a:r>
+              <a:rPr lang="pt-BR" sz="3200" dirty="0">
+                <a:solidFill>
+                  <a:srgbClr val="253746"/>
+                </a:solidFill>
+              </a:rPr>
+              <a:t>https://www.smartcleaning.com.br</a:t>
+            </a:r>
+            <a:r>
+              <a:rPr lang="pt-PT" altLang="pt-BR" sz="3200" dirty="0">
+                <a:solidFill>
+                  <a:srgbClr val="253746"/>
+                </a:solidFill>
+              </a:rPr>
+              <a:t>/</a:t>
+            </a:r>
+            <a:endParaRPr lang="pt-PT" altLang="pt-BR" sz="3200" dirty="0">
               <a:solidFill>
                 <a:srgbClr val="253746"/>
               </a:solidFill>
             </a:endParaRPr>
           </a:p>
           <a:p>
-            <a:endParaRPr lang="pt-BR" sz="2400" dirty="0">
+            <a:r>
+              <a:rPr lang="pt-BR" sz="3200" dirty="0">
+                <a:solidFill>
+                  <a:srgbClr val="253746"/>
+                </a:solidFill>
+              </a:rPr>
+              <a:t>https://www.maryhelp.com.br/unidade/sao-paulo-vila-matilde</a:t>
+            </a:r>
+            <a:endParaRPr lang="pt-BR" sz="3200" dirty="0">
+              <a:solidFill>
+                <a:srgbClr val="253746"/>
+              </a:solidFill>
+            </a:endParaRPr>
+          </a:p>
+          <a:p>
+            <a:endParaRPr lang="pt-BR" sz="3200" dirty="0">
               <a:solidFill>
                 <a:srgbClr val="253746"/>
               </a:solidFill>
@@ -15682,6 +15927,202 @@
                                           <p:spTgt spid="2">
                                             <p:txEl>
                                               <p:pRg st="0" end="0"/>
+                                            </p:txEl>
+                                          </p:spTgt>
+                                        </p:tgtEl>
+                                        <p:attrNameLst>
+                                          <p:attrName>style.visibility</p:attrName>
+                                        </p:attrNameLst>
+                                      </p:cBhvr>
+                                      <p:to>
+                                        <p:strVal val="visible"/>
+                                      </p:to>
+                                    </p:set>
+                                  </p:childTnLst>
+                                </p:cTn>
+                              </p:par>
+                            </p:childTnLst>
+                          </p:cTn>
+                        </p:par>
+                      </p:childTnLst>
+                    </p:cTn>
+                  </p:par>
+                  <p:par>
+                    <p:cTn id="7" fill="hold">
+                      <p:stCondLst>
+                        <p:cond delay="indefinite"/>
+                      </p:stCondLst>
+                      <p:childTnLst>
+                        <p:par>
+                          <p:cTn id="8" fill="hold">
+                            <p:stCondLst>
+                              <p:cond delay="0"/>
+                            </p:stCondLst>
+                            <p:childTnLst>
+                              <p:par>
+                                <p:cTn id="9" presetID="1" presetClass="entr" presetSubtype="0" fill="hold" grpId="0" nodeType="clickEffect">
+                                  <p:stCondLst>
+                                    <p:cond delay="0"/>
+                                  </p:stCondLst>
+                                  <p:childTnLst>
+                                    <p:set>
+                                      <p:cBhvr>
+                                        <p:cTn id="10" dur="1" fill="hold">
+                                          <p:stCondLst>
+                                            <p:cond delay="0"/>
+                                          </p:stCondLst>
+                                        </p:cTn>
+                                        <p:tgtEl>
+                                          <p:spTgt spid="2">
+                                            <p:txEl>
+                                              <p:pRg st="2" end="2"/>
+                                            </p:txEl>
+                                          </p:spTgt>
+                                        </p:tgtEl>
+                                        <p:attrNameLst>
+                                          <p:attrName>style.visibility</p:attrName>
+                                        </p:attrNameLst>
+                                      </p:cBhvr>
+                                      <p:to>
+                                        <p:strVal val="visible"/>
+                                      </p:to>
+                                    </p:set>
+                                  </p:childTnLst>
+                                </p:cTn>
+                              </p:par>
+                            </p:childTnLst>
+                          </p:cTn>
+                        </p:par>
+                      </p:childTnLst>
+                    </p:cTn>
+                  </p:par>
+                  <p:par>
+                    <p:cTn id="11" fill="hold">
+                      <p:stCondLst>
+                        <p:cond delay="indefinite"/>
+                      </p:stCondLst>
+                      <p:childTnLst>
+                        <p:par>
+                          <p:cTn id="12" fill="hold">
+                            <p:stCondLst>
+                              <p:cond delay="0"/>
+                            </p:stCondLst>
+                            <p:childTnLst>
+                              <p:par>
+                                <p:cTn id="13" presetID="1" presetClass="entr" presetSubtype="0" fill="hold" grpId="0" nodeType="clickEffect">
+                                  <p:stCondLst>
+                                    <p:cond delay="0"/>
+                                  </p:stCondLst>
+                                  <p:childTnLst>
+                                    <p:set>
+                                      <p:cBhvr>
+                                        <p:cTn id="14" dur="1" fill="hold">
+                                          <p:stCondLst>
+                                            <p:cond delay="0"/>
+                                          </p:stCondLst>
+                                        </p:cTn>
+                                        <p:tgtEl>
+                                          <p:spTgt spid="2">
+                                            <p:txEl>
+                                              <p:pRg st="3" end="3"/>
+                                            </p:txEl>
+                                          </p:spTgt>
+                                        </p:tgtEl>
+                                        <p:attrNameLst>
+                                          <p:attrName>style.visibility</p:attrName>
+                                        </p:attrNameLst>
+                                      </p:cBhvr>
+                                      <p:to>
+                                        <p:strVal val="visible"/>
+                                      </p:to>
+                                    </p:set>
+                                  </p:childTnLst>
+                                </p:cTn>
+                              </p:par>
+                            </p:childTnLst>
+                          </p:cTn>
+                        </p:par>
+                      </p:childTnLst>
+                    </p:cTn>
+                  </p:par>
+                  <p:par>
+                    <p:cTn id="15" fill="hold">
+                      <p:stCondLst>
+                        <p:cond delay="indefinite"/>
+                      </p:stCondLst>
+                      <p:childTnLst>
+                        <p:par>
+                          <p:cTn id="16" fill="hold">
+                            <p:stCondLst>
+                              <p:cond delay="0"/>
+                            </p:stCondLst>
+                            <p:childTnLst>
+                              <p:par>
+                                <p:cTn id="17" presetID="1" presetClass="entr" presetSubtype="0" fill="hold" grpId="0" nodeType="clickEffect">
+                                  <p:stCondLst>
+                                    <p:cond delay="0"/>
+                                  </p:stCondLst>
+                                  <p:childTnLst>
+                                    <p:set>
+                                      <p:cBhvr>
+                                        <p:cTn id="18" dur="1" fill="hold">
+                                          <p:stCondLst>
+                                            <p:cond delay="0"/>
+                                          </p:stCondLst>
+                                        </p:cTn>
+                                        <p:tgtEl>
+                                          <p:spTgt spid="2">
+                                            <p:txEl>
+                                              <p:pRg st="4" end="4"/>
+                                            </p:txEl>
+                                          </p:spTgt>
+                                        </p:tgtEl>
+                                        <p:attrNameLst>
+                                          <p:attrName>style.visibility</p:attrName>
+                                        </p:attrNameLst>
+                                      </p:cBhvr>
+                                      <p:to>
+                                        <p:strVal val="visible"/>
+                                      </p:to>
+                                    </p:set>
+                                  </p:childTnLst>
+                                </p:cTn>
+                              </p:par>
+                            </p:childTnLst>
+                          </p:cTn>
+                        </p:par>
+                      </p:childTnLst>
+                    </p:cTn>
+                  </p:par>
+                  <p:par>
+                    <p:cTn id="19" fill="hold">
+                      <p:stCondLst>
+                        <p:cond delay="indefinite"/>
+                      </p:stCondLst>
+                      <p:childTnLst>
+                        <p:par>
+                          <p:cTn id="20" fill="hold">
+                            <p:stCondLst>
+                              <p:cond delay="0"/>
+                            </p:stCondLst>
+                            <p:childTnLst>
+                              <p:par>
+                                <p:cTn id="21" presetID="1" presetClass="entr" presetSubtype="0" fill="hold" grpId="0" nodeType="clickEffect">
+                                  <p:stCondLst>
+                                    <p:cond delay="0"/>
+                                  </p:stCondLst>
+                                  <p:childTnLst>
+                                    <p:set>
+                                      <p:cBhvr>
+                                        <p:cTn id="22" dur="1" fill="hold">
+                                          <p:stCondLst>
+                                            <p:cond delay="0"/>
+                                          </p:stCondLst>
+                                        </p:cTn>
+                                        <p:tgtEl>
+                                          <p:spTgt spid="2">
+                                            <p:txEl>
+                                              <p:pRg st="5" end="5"/>
                                             </p:txEl>
                                           </p:spTgt>
                                         </p:tgtEl>
@@ -16813,839 +17254,1050 @@
       </p:grpSpPr>
       <p:sp>
         <p:nvSpPr>
-          <p:cNvPr id="3" name="Espaço Reservado para Número de Slide 2"/>
-          <p:cNvSpPr>
-            <a:spLocks noGrp="1"/>
-          </p:cNvSpPr>
-          <p:nvPr>
-            <p:ph type="sldNum" sz="quarter" idx="4"/>
-          </p:nvPr>
-        </p:nvSpPr>
-        <p:spPr>
-          <a:xfrm>
-            <a:off x="11925477" y="7237015"/>
-            <a:ext cx="628646" cy="214290"/>
-          </a:xfrm>
-        </p:spPr>
-        <p:txBody>
-          <a:bodyPr/>
-          <a:lstStyle/>
-          <a:p>
-            <a:pPr>
-              <a:defRPr/>
-            </a:pPr>
-            <a:fld id="{B66251D2-9488-44CD-87B4-F793A73C4A01}" type="slidenum">
-              <a:rPr lang="pt-BR" smtClean="0"/>
-            </a:fld>
-            <a:endParaRPr lang="pt-BR" sz="880"/>
-          </a:p>
-        </p:txBody>
-      </p:sp>
-      <p:sp>
-        <p:nvSpPr>
-          <p:cNvPr id="4" name="Espaço Reservado para Texto 3"/>
-          <p:cNvSpPr>
-            <a:spLocks noGrp="1"/>
-          </p:cNvSpPr>
-          <p:nvPr>
-            <p:ph type="body" sz="quarter" idx="13"/>
-          </p:nvPr>
-        </p:nvSpPr>
-        <p:spPr/>
-        <p:txBody>
-          <a:bodyPr/>
-          <a:lstStyle/>
-          <a:p>
-            <a:r>
-              <a:rPr lang="pt-BR" dirty="0"/>
-              <a:t>2. </a:t>
-            </a:r>
-            <a:r>
-              <a:rPr lang="pt-BR" dirty="0" err="1"/>
-              <a:t>Proto-Persona</a:t>
-            </a:r>
-            <a:r>
-              <a:rPr lang="pt-BR" dirty="0"/>
-              <a:t> 1 – Usuário/Necessidades</a:t>
-            </a:r>
-            <a:endParaRPr lang="pt-BR" dirty="0"/>
-          </a:p>
-        </p:txBody>
-      </p:sp>
-      <p:sp>
-        <p:nvSpPr>
-          <p:cNvPr id="6" name="Retângulo 5"/>
+          <p:cNvPr id="2" name="object 2"/>
           <p:cNvSpPr/>
           <p:nvPr/>
         </p:nvSpPr>
         <p:spPr>
           <a:xfrm>
-            <a:off x="929546" y="1404367"/>
-            <a:ext cx="5760000" cy="2880000"/>
+            <a:off x="5991316" y="154938"/>
+            <a:ext cx="536195" cy="574277"/>
           </a:xfrm>
           <a:prstGeom prst="rect">
             <a:avLst/>
           </a:prstGeom>
-          <a:noFill/>
-          <a:ln>
-            <a:solidFill>
-              <a:srgbClr val="253746"/>
-            </a:solidFill>
-          </a:ln>
+          <a:blipFill>
+            <a:blip r:embed="rId1" cstate="print"/>
+            <a:stretch>
+              <a:fillRect/>
+            </a:stretch>
+          </a:blipFill>
         </p:spPr>
-        <p:style>
-          <a:lnRef idx="2">
-            <a:schemeClr val="accent1">
-              <a:shade val="50000"/>
-            </a:schemeClr>
-          </a:lnRef>
-          <a:fillRef idx="1">
-            <a:schemeClr val="accent1"/>
-          </a:fillRef>
-          <a:effectRef idx="0">
-            <a:schemeClr val="accent1"/>
-          </a:effectRef>
-          <a:fontRef idx="minor">
-            <a:schemeClr val="lt1"/>
-          </a:fontRef>
-        </p:style>
         <p:txBody>
-          <a:bodyPr rtlCol="0" anchor="ctr"/>
+          <a:bodyPr wrap="square" lIns="0" tIns="0" rIns="0" bIns="0" rtlCol="0"/>
           <a:lstStyle/>
-          <a:p>
-            <a:pPr algn="ctr"/>
-            <a:endParaRPr lang="pt-BR"/>
-          </a:p>
+          <a:p/>
         </p:txBody>
       </p:sp>
       <p:sp>
         <p:nvSpPr>
-          <p:cNvPr id="7" name="Retângulo 6"/>
-          <p:cNvSpPr/>
-          <p:nvPr/>
-        </p:nvSpPr>
-        <p:spPr>
-          <a:xfrm>
-            <a:off x="929546" y="4356975"/>
-            <a:ext cx="11592008" cy="2056888"/>
-          </a:xfrm>
-          <a:prstGeom prst="rect">
-            <a:avLst/>
-          </a:prstGeom>
-          <a:noFill/>
-          <a:ln>
-            <a:solidFill>
-              <a:srgbClr val="253746"/>
-            </a:solidFill>
-          </a:ln>
-        </p:spPr>
-        <p:style>
-          <a:lnRef idx="2">
-            <a:schemeClr val="accent1">
-              <a:shade val="50000"/>
-            </a:schemeClr>
-          </a:lnRef>
-          <a:fillRef idx="1">
-            <a:schemeClr val="accent1"/>
-          </a:fillRef>
-          <a:effectRef idx="0">
-            <a:schemeClr val="accent1"/>
-          </a:effectRef>
-          <a:fontRef idx="minor">
-            <a:schemeClr val="lt1"/>
-          </a:fontRef>
-        </p:style>
-        <p:txBody>
-          <a:bodyPr rtlCol="0" anchor="ctr"/>
-          <a:lstStyle/>
-          <a:p>
-            <a:pPr algn="ctr"/>
-            <a:endParaRPr lang="pt-BR"/>
-          </a:p>
-        </p:txBody>
-      </p:sp>
-      <p:sp>
-        <p:nvSpPr>
-          <p:cNvPr id="9" name="Retângulo 8"/>
-          <p:cNvSpPr/>
-          <p:nvPr/>
-        </p:nvSpPr>
-        <p:spPr>
-          <a:xfrm>
-            <a:off x="6761554" y="1404647"/>
-            <a:ext cx="5760000" cy="2880000"/>
-          </a:xfrm>
-          <a:prstGeom prst="rect">
-            <a:avLst/>
-          </a:prstGeom>
-          <a:noFill/>
-          <a:ln>
-            <a:solidFill>
-              <a:srgbClr val="253746"/>
-            </a:solidFill>
-          </a:ln>
-        </p:spPr>
-        <p:style>
-          <a:lnRef idx="2">
-            <a:schemeClr val="accent1">
-              <a:shade val="50000"/>
-            </a:schemeClr>
-          </a:lnRef>
-          <a:fillRef idx="1">
-            <a:schemeClr val="accent1"/>
-          </a:fillRef>
-          <a:effectRef idx="0">
-            <a:schemeClr val="accent1"/>
-          </a:effectRef>
-          <a:fontRef idx="minor">
-            <a:schemeClr val="lt1"/>
-          </a:fontRef>
-        </p:style>
-        <p:txBody>
-          <a:bodyPr rtlCol="0" anchor="ctr"/>
-          <a:lstStyle/>
-          <a:p>
-            <a:pPr algn="ctr"/>
-            <a:endParaRPr lang="pt-BR"/>
-          </a:p>
-        </p:txBody>
-      </p:sp>
-      <p:sp>
-        <p:nvSpPr>
-          <p:cNvPr id="10" name="Espaço Reservado para Texto 1"/>
-          <p:cNvSpPr>
+          <p:cNvPr id="3" name="object 3"/>
+          <p:cNvSpPr txBox="1">
             <a:spLocks noGrp="1"/>
           </p:cNvSpPr>
           <p:nvPr>
-            <p:ph type="body" sz="quarter" idx="11"/>
+            <p:ph type="title"/>
           </p:nvPr>
         </p:nvSpPr>
         <p:spPr>
           <a:xfrm>
-            <a:off x="2153042" y="756295"/>
-            <a:ext cx="12201281" cy="1440597"/>
-          </a:xfrm>
-        </p:spPr>
-        <p:txBody>
-          <a:bodyPr/>
-          <a:lstStyle/>
-          <a:p>
-            <a:pPr marL="0" indent="0">
-              <a:buNone/>
-            </a:pPr>
-            <a:r>
-              <a:rPr lang="pt-BR" sz="3200"/>
-              <a:t>Usuário frequente de serviço de diarista (1x semana)</a:t>
-            </a:r>
-            <a:endParaRPr lang="pt-BR" sz="3200"/>
-          </a:p>
-        </p:txBody>
-      </p:sp>
-      <p:sp>
-        <p:nvSpPr>
-          <p:cNvPr id="12" name="Retângulo 11"/>
-          <p:cNvSpPr/>
-          <p:nvPr/>
-        </p:nvSpPr>
-        <p:spPr>
-          <a:xfrm>
-            <a:off x="2813818" y="2268900"/>
-            <a:ext cx="3998794" cy="954107"/>
+            <a:off x="2262496" y="146813"/>
+            <a:ext cx="9221559" cy="590550"/>
           </a:xfrm>
           <a:prstGeom prst="rect">
             <a:avLst/>
           </a:prstGeom>
         </p:spPr>
         <p:txBody>
-          <a:bodyPr wrap="square">
+          <a:bodyPr vert="horz" wrap="square" lIns="0" tIns="14597" rIns="0" bIns="0" rtlCol="0">
             <a:spAutoFit/>
           </a:bodyPr>
           <a:lstStyle/>
           <a:p>
-            <a:r>
-              <a:rPr lang="pt-BR" sz="2000" dirty="0">
-                <a:latin typeface="Exo 2" pitchFamily="50" charset="0"/>
-              </a:rPr>
-              <a:t>Mary</a:t>
-            </a:r>
-            <a:endParaRPr lang="pt-BR" sz="2000" dirty="0">
-              <a:latin typeface="Exo 2" pitchFamily="50" charset="0"/>
-            </a:endParaRPr>
-          </a:p>
-          <a:p>
-            <a:r>
-              <a:rPr lang="pt-BR" sz="1800" dirty="0">
-                <a:latin typeface="Exo 2" pitchFamily="50" charset="0"/>
-              </a:rPr>
-              <a:t>“Sou nova na cidade e não consigo achar diarista confiável.”</a:t>
-            </a:r>
-            <a:endParaRPr lang="pt-BR" sz="1800" dirty="0">
-              <a:latin typeface="Exo 2" pitchFamily="50" charset="0"/>
-            </a:endParaRPr>
+            <a:pPr marL="12700">
+              <a:lnSpc>
+                <a:spcPct val="100000"/>
+              </a:lnSpc>
+              <a:spcBef>
+                <a:spcPts val="115"/>
+              </a:spcBef>
+              <a:tabLst>
+                <a:tab pos="4100195" algn="l"/>
+              </a:tabLst>
+            </a:pPr>
+            <a:r>
+              <a:rPr spc="15" dirty="0"/>
+              <a:t>Proto-Persona</a:t>
+            </a:r>
+            <a:r>
+              <a:rPr spc="-265" dirty="0"/>
+              <a:t> </a:t>
+            </a:r>
+            <a:r>
+              <a:rPr spc="10" dirty="0"/>
+              <a:t>1	</a:t>
+            </a:r>
+            <a:r>
+              <a:rPr spc="-25" dirty="0"/>
+              <a:t>Usuário/</a:t>
+            </a:r>
+            <a:r>
+              <a:rPr spc="-555" dirty="0"/>
+              <a:t> </a:t>
+            </a:r>
+            <a:r>
+              <a:rPr spc="-15" dirty="0"/>
+              <a:t>Necessidades</a:t>
+            </a:r>
+            <a:endParaRPr spc="-15" dirty="0"/>
           </a:p>
         </p:txBody>
       </p:sp>
       <p:sp>
         <p:nvSpPr>
-          <p:cNvPr id="13" name="Retângulo 12"/>
+          <p:cNvPr id="4" name="object 4"/>
           <p:cNvSpPr/>
           <p:nvPr/>
         </p:nvSpPr>
         <p:spPr>
           <a:xfrm>
-            <a:off x="6761554" y="2003797"/>
-            <a:ext cx="5760000" cy="1754326"/>
+            <a:off x="6759557" y="1406059"/>
+            <a:ext cx="5756731" cy="2877731"/>
+          </a:xfrm>
+          <a:custGeom>
+            <a:avLst/>
+            <a:gdLst/>
+            <a:ahLst/>
+            <a:cxnLst/>
+            <a:rect l="l" t="t" r="r" b="b"/>
+            <a:pathLst>
+              <a:path w="5759450" h="2879090">
+                <a:moveTo>
+                  <a:pt x="0" y="2878836"/>
+                </a:moveTo>
+                <a:lnTo>
+                  <a:pt x="5759196" y="2878836"/>
+                </a:lnTo>
+                <a:lnTo>
+                  <a:pt x="5759196" y="0"/>
+                </a:lnTo>
+                <a:lnTo>
+                  <a:pt x="0" y="0"/>
+                </a:lnTo>
+                <a:lnTo>
+                  <a:pt x="0" y="2878836"/>
+                </a:lnTo>
+                <a:close/>
+              </a:path>
+            </a:pathLst>
+          </a:custGeom>
+          <a:ln w="25400">
+            <a:solidFill>
+              <a:srgbClr val="243746"/>
+            </a:solidFill>
+          </a:ln>
+        </p:spPr>
+        <p:txBody>
+          <a:bodyPr wrap="square" lIns="0" tIns="0" rIns="0" bIns="0" rtlCol="0"/>
+          <a:lstStyle/>
+          <a:p/>
+        </p:txBody>
+      </p:sp>
+      <p:sp>
+        <p:nvSpPr>
+          <p:cNvPr id="5" name="object 5"/>
+          <p:cNvSpPr txBox="1"/>
+          <p:nvPr/>
+        </p:nvSpPr>
+        <p:spPr>
+          <a:xfrm>
+            <a:off x="3076875" y="788495"/>
+            <a:ext cx="9508444" cy="504190"/>
           </a:xfrm>
           <a:prstGeom prst="rect">
             <a:avLst/>
           </a:prstGeom>
         </p:spPr>
         <p:txBody>
-          <a:bodyPr wrap="square">
+          <a:bodyPr vert="horz" wrap="square" lIns="0" tIns="12694" rIns="0" bIns="0" rtlCol="0" anchor="t">
             <a:spAutoFit/>
           </a:bodyPr>
           <a:lstStyle/>
           <a:p>
-            <a:pPr marL="342900" indent="-342900">
-              <a:buFont typeface="Arial" panose="020B0604020202020204" pitchFamily="34" charset="0"/>
-              <a:buChar char="•"/>
+            <a:pPr marL="12700">
+              <a:spcBef>
+                <a:spcPts val="100"/>
+              </a:spcBef>
             </a:pPr>
             <a:r>
-              <a:rPr lang="pt-BR" sz="1800" dirty="0">
-                <a:latin typeface="Exo 2" pitchFamily="50" charset="0"/>
+              <a:rPr sz="3200" spc="15" dirty="0">
+                <a:latin typeface="Arial" panose="020B0604020202020204"/>
+                <a:cs typeface="Arial" panose="020B0604020202020204"/>
               </a:rPr>
-              <a:t>Conectada (mas não </a:t>
-            </a:r>
-            <a:r>
-              <a:rPr lang="pt-BR" sz="1800" dirty="0" err="1">
-                <a:latin typeface="Exo 2" pitchFamily="50" charset="0"/>
+              <a:t>Usuário</a:t>
+            </a:r>
+            <a:r>
+              <a:rPr sz="3200" spc="-210" dirty="0">
+                <a:latin typeface="Arial" panose="020B0604020202020204"/>
+                <a:cs typeface="Arial" panose="020B0604020202020204"/>
               </a:rPr>
-              <a:t>early-adopter</a:t>
-            </a:r>
-            <a:r>
-              <a:rPr lang="pt-BR" sz="1800" dirty="0">
-                <a:latin typeface="Exo 2" pitchFamily="50" charset="0"/>
+              <a:t> </a:t>
+            </a:r>
+            <a:r>
+              <a:rPr sz="3200" spc="45" dirty="0">
+                <a:latin typeface="Arial" panose="020B0604020202020204"/>
+                <a:cs typeface="Arial" panose="020B0604020202020204"/>
               </a:rPr>
-              <a:t>)</a:t>
-            </a:r>
-            <a:endParaRPr lang="pt-BR" sz="1800" dirty="0">
-              <a:latin typeface="Exo 2" pitchFamily="50" charset="0"/>
-            </a:endParaRPr>
-          </a:p>
-          <a:p>
-            <a:pPr marL="342900" indent="-342900">
-              <a:buFont typeface="Arial" panose="020B0604020202020204" pitchFamily="34" charset="0"/>
-              <a:buChar char="•"/>
-            </a:pPr>
-            <a:r>
-              <a:rPr lang="pt-BR" sz="1800" dirty="0">
-                <a:latin typeface="Exo 2" pitchFamily="50" charset="0"/>
+              <a:t>frequente</a:t>
+            </a:r>
+            <a:r>
+              <a:rPr sz="3200" spc="-235" dirty="0">
+                <a:latin typeface="Arial" panose="020B0604020202020204"/>
+                <a:cs typeface="Arial" panose="020B0604020202020204"/>
               </a:rPr>
-              <a:t>Atarefada</a:t>
-            </a:r>
-            <a:endParaRPr lang="pt-BR" sz="1800" dirty="0">
-              <a:latin typeface="Exo 2" pitchFamily="50" charset="0"/>
-            </a:endParaRPr>
-          </a:p>
-          <a:p>
-            <a:pPr marL="342900" indent="-342900">
-              <a:buFont typeface="Arial" panose="020B0604020202020204" pitchFamily="34" charset="0"/>
-              <a:buChar char="•"/>
-            </a:pPr>
-            <a:r>
-              <a:rPr lang="pt-BR" sz="1800" dirty="0">
-                <a:latin typeface="Exo 2" pitchFamily="50" charset="0"/>
+              <a:t> </a:t>
+            </a:r>
+            <a:r>
+              <a:rPr sz="3200" spc="10" dirty="0">
+                <a:latin typeface="Arial" panose="020B0604020202020204"/>
+                <a:cs typeface="Arial" panose="020B0604020202020204"/>
               </a:rPr>
-              <a:t>Solicita serviços como Comida via App</a:t>
-            </a:r>
-            <a:endParaRPr lang="pt-BR" sz="1800" dirty="0">
-              <a:latin typeface="Exo 2" pitchFamily="50" charset="0"/>
-            </a:endParaRPr>
-          </a:p>
-          <a:p>
-            <a:pPr marL="342900" indent="-342900">
-              <a:buFont typeface="Arial" panose="020B0604020202020204" pitchFamily="34" charset="0"/>
-              <a:buChar char="•"/>
-            </a:pPr>
-            <a:r>
-              <a:rPr lang="pt-BR" sz="1800" dirty="0">
-                <a:latin typeface="Exo 2" pitchFamily="50" charset="0"/>
+              <a:t>de</a:t>
+            </a:r>
+            <a:r>
+              <a:rPr sz="3200" spc="-215" dirty="0">
+                <a:latin typeface="Arial" panose="020B0604020202020204"/>
+                <a:cs typeface="Arial" panose="020B0604020202020204"/>
               </a:rPr>
-              <a:t>Gosta de utilizar Redes Sociais</a:t>
-            </a:r>
-            <a:endParaRPr lang="pt-BR" sz="1800" dirty="0">
-              <a:latin typeface="Exo 2" pitchFamily="50" charset="0"/>
-            </a:endParaRPr>
-          </a:p>
-          <a:p>
-            <a:pPr marL="342900" indent="-342900">
-              <a:buFont typeface="Arial" panose="020B0604020202020204" pitchFamily="34" charset="0"/>
-              <a:buChar char="•"/>
-            </a:pPr>
-            <a:r>
-              <a:rPr lang="pt-BR" sz="1800" dirty="0">
-                <a:latin typeface="Exo 2" pitchFamily="50" charset="0"/>
+              <a:t> </a:t>
+            </a:r>
+            <a:r>
+              <a:rPr sz="3200" spc="20" dirty="0">
+                <a:latin typeface="Arial" panose="020B0604020202020204"/>
+                <a:cs typeface="Arial" panose="020B0604020202020204"/>
               </a:rPr>
-              <a:t>Mora longe do Centro</a:t>
-            </a:r>
-            <a:endParaRPr lang="pt-BR" sz="1800" dirty="0">
-              <a:latin typeface="Exo 2" pitchFamily="50" charset="0"/>
-            </a:endParaRPr>
-          </a:p>
-          <a:p>
-            <a:pPr marL="342900" indent="-342900">
-              <a:buFont typeface="Arial" panose="020B0604020202020204" pitchFamily="34" charset="0"/>
-              <a:buChar char="•"/>
-            </a:pPr>
-            <a:r>
-              <a:rPr lang="pt-BR" sz="1800" dirty="0">
-                <a:latin typeface="Exo 2" pitchFamily="50" charset="0"/>
+              <a:t>serviço</a:t>
+            </a:r>
+            <a:r>
+              <a:rPr sz="3200" spc="-200" dirty="0">
+                <a:latin typeface="Arial" panose="020B0604020202020204"/>
+                <a:cs typeface="Arial" panose="020B0604020202020204"/>
               </a:rPr>
-              <a:t>É impaciente</a:t>
-            </a:r>
-            <a:endParaRPr lang="pt-BR" sz="1800" dirty="0">
-              <a:latin typeface="Exo 2" pitchFamily="50" charset="0"/>
+              <a:t> </a:t>
+            </a:r>
+            <a:r>
+              <a:rPr sz="3200" spc="10" dirty="0">
+                <a:latin typeface="Arial" panose="020B0604020202020204"/>
+                <a:cs typeface="Arial" panose="020B0604020202020204"/>
+              </a:rPr>
+              <a:t>de</a:t>
+            </a:r>
+            <a:r>
+              <a:rPr sz="3200" spc="-220" dirty="0">
+                <a:latin typeface="Arial" panose="020B0604020202020204"/>
+                <a:cs typeface="Arial" panose="020B0604020202020204"/>
+              </a:rPr>
+              <a:t> </a:t>
+            </a:r>
+            <a:r>
+              <a:rPr sz="3200" spc="50">
+                <a:latin typeface="Arial" panose="020B0604020202020204"/>
+                <a:cs typeface="Arial" panose="020B0604020202020204"/>
+              </a:rPr>
+              <a:t>diarista</a:t>
+            </a:r>
+            <a:r>
+              <a:rPr lang="pt-BR" sz="3200" spc="-204" dirty="0">
+                <a:latin typeface="Arial" panose="020B0604020202020204"/>
+                <a:cs typeface="Arial" panose="020B0604020202020204"/>
+              </a:rPr>
+              <a:t> </a:t>
+            </a:r>
+            <a:endParaRPr lang="pt-BR" sz="3200" spc="-15">
+              <a:latin typeface="Arial" panose="020B0604020202020204"/>
+              <a:cs typeface="Arial" panose="020B0604020202020204"/>
             </a:endParaRPr>
           </a:p>
         </p:txBody>
       </p:sp>
       <p:sp>
         <p:nvSpPr>
-          <p:cNvPr id="16" name="Retângulo 15"/>
-          <p:cNvSpPr/>
+          <p:cNvPr id="10" name="object 10"/>
+          <p:cNvSpPr txBox="1"/>
           <p:nvPr/>
         </p:nvSpPr>
         <p:spPr>
           <a:xfrm>
-            <a:off x="857538" y="6507884"/>
-            <a:ext cx="4329519" cy="307777"/>
+            <a:off x="6850445" y="2037205"/>
+            <a:ext cx="4248048" cy="1950720"/>
           </a:xfrm>
           <a:prstGeom prst="rect">
             <a:avLst/>
           </a:prstGeom>
         </p:spPr>
         <p:txBody>
-          <a:bodyPr wrap="none">
+          <a:bodyPr vert="horz" wrap="square" lIns="0" tIns="12694" rIns="0" bIns="0" rtlCol="0" anchor="t">
             <a:spAutoFit/>
           </a:bodyPr>
           <a:lstStyle/>
           <a:p>
-            <a:r>
-              <a:rPr lang="pt-BR" sz="1400" dirty="0"/>
-              <a:t>Modelo baseado em </a:t>
-            </a:r>
-            <a:r>
-              <a:rPr lang="pt-BR" sz="1400" dirty="0" err="1"/>
-              <a:t>Lean</a:t>
-            </a:r>
-            <a:r>
-              <a:rPr lang="pt-BR" sz="1400" dirty="0"/>
-              <a:t> UX. Não é amostra estatística. </a:t>
-            </a:r>
-            <a:endParaRPr lang="pt-BR" sz="1400" dirty="0"/>
+            <a:pPr marL="341630" indent="-342265">
+              <a:spcBef>
+                <a:spcPts val="100"/>
+              </a:spcBef>
+              <a:buChar char="•"/>
+              <a:tabLst>
+                <a:tab pos="341630" algn="l"/>
+                <a:tab pos="342265" algn="l"/>
+              </a:tabLst>
+            </a:pPr>
+            <a:r>
+              <a:rPr lang="pt-BR" spc="30" dirty="0">
+                <a:latin typeface="Arial" panose="020B0604020202020204"/>
+                <a:cs typeface="Arial" panose="020B0604020202020204"/>
+              </a:rPr>
+              <a:t>Heavy-</a:t>
+            </a:r>
+            <a:r>
+              <a:rPr lang="pt-BR" spc="30" noProof="1">
+                <a:latin typeface="Arial" panose="020B0604020202020204"/>
+                <a:cs typeface="Arial" panose="020B0604020202020204"/>
+              </a:rPr>
+              <a:t>user </a:t>
+            </a:r>
+            <a:r>
+              <a:rPr lang="pt-BR" spc="30" dirty="0">
+                <a:latin typeface="Arial" panose="020B0604020202020204"/>
+                <a:cs typeface="Arial" panose="020B0604020202020204"/>
+              </a:rPr>
+              <a:t>de internet</a:t>
+            </a:r>
+            <a:endParaRPr lang="pt-BR" sz="1800" spc="30" dirty="0">
+              <a:latin typeface="Arial" panose="020B0604020202020204"/>
+              <a:cs typeface="Arial" panose="020B0604020202020204"/>
+            </a:endParaRPr>
+          </a:p>
+          <a:p>
+            <a:pPr marL="342265" indent="-342900">
+              <a:buChar char="•"/>
+              <a:tabLst>
+                <a:tab pos="342265" algn="l"/>
+                <a:tab pos="342900" algn="l"/>
+              </a:tabLst>
+            </a:pPr>
+            <a:r>
+              <a:rPr lang="pt-BR" spc="10" dirty="0">
+                <a:latin typeface="Arial" panose="020B0604020202020204"/>
+                <a:cs typeface="Arial" panose="020B0604020202020204"/>
+              </a:rPr>
+              <a:t>Vive correndo </a:t>
+            </a:r>
+            <a:endParaRPr lang="pt-BR" sz="1800" spc="10" dirty="0">
+              <a:latin typeface="Arial" panose="020B0604020202020204"/>
+              <a:cs typeface="Arial" panose="020B0604020202020204"/>
+            </a:endParaRPr>
+          </a:p>
+          <a:p>
+            <a:pPr marL="341630" indent="-342265">
+              <a:buFont typeface="Arial" panose="020B0604020202020204"/>
+              <a:buChar char="•"/>
+              <a:tabLst>
+                <a:tab pos="341630" algn="l"/>
+                <a:tab pos="342265" algn="l"/>
+              </a:tabLst>
+            </a:pPr>
+            <a:r>
+              <a:rPr lang="pt-BR" spc="10" dirty="0">
+                <a:latin typeface="Arial" panose="020B0604020202020204"/>
+                <a:cs typeface="Arial" panose="020B0604020202020204"/>
+              </a:rPr>
+              <a:t>Bem remunerada</a:t>
+            </a:r>
+            <a:endParaRPr sz="1800" dirty="0">
+              <a:latin typeface="Arial" panose="020B0604020202020204"/>
+              <a:cs typeface="Arial" panose="020B0604020202020204"/>
+            </a:endParaRPr>
+          </a:p>
+          <a:p>
+            <a:pPr marL="341630" indent="-342265">
+              <a:buFont typeface="Arial" panose="020B0604020202020204"/>
+              <a:buChar char="•"/>
+              <a:tabLst>
+                <a:tab pos="341630" algn="l"/>
+                <a:tab pos="342265" algn="l"/>
+              </a:tabLst>
+            </a:pPr>
+            <a:r>
+              <a:rPr lang="pt-BR" spc="-10" dirty="0">
+                <a:latin typeface="Arial" panose="020B0604020202020204"/>
+                <a:cs typeface="Arial" panose="020B0604020202020204"/>
+              </a:rPr>
+              <a:t>Viaja bastante</a:t>
+            </a:r>
+            <a:endParaRPr sz="1800" dirty="0">
+              <a:latin typeface="Arial" panose="020B0604020202020204"/>
+              <a:cs typeface="Arial" panose="020B0604020202020204"/>
+            </a:endParaRPr>
+          </a:p>
+          <a:p>
+            <a:pPr marL="342900" indent="-343535">
+              <a:buFont typeface="Arial" panose="020B0604020202020204"/>
+              <a:buChar char="•"/>
+              <a:tabLst>
+                <a:tab pos="342900" algn="l"/>
+                <a:tab pos="343535" algn="l"/>
+              </a:tabLst>
+            </a:pPr>
+            <a:r>
+              <a:rPr lang="pt-BR" spc="25" dirty="0">
+                <a:latin typeface="Arial" panose="020B0604020202020204"/>
+                <a:cs typeface="Arial" panose="020B0604020202020204"/>
+              </a:rPr>
+              <a:t>Tem filhos</a:t>
+            </a:r>
+            <a:endParaRPr lang="pt-BR" sz="1800" spc="25" dirty="0">
+              <a:latin typeface="Arial" panose="020B0604020202020204"/>
+              <a:cs typeface="Arial" panose="020B0604020202020204"/>
+            </a:endParaRPr>
+          </a:p>
+          <a:p>
+            <a:pPr marL="341630" indent="-342265">
+              <a:lnSpc>
+                <a:spcPct val="100000"/>
+              </a:lnSpc>
+              <a:buChar char="•"/>
+              <a:tabLst>
+                <a:tab pos="341630" algn="l"/>
+                <a:tab pos="342265" algn="l"/>
+              </a:tabLst>
+            </a:pPr>
+            <a:r>
+              <a:rPr lang="pt-BR" spc="10" dirty="0">
+                <a:latin typeface="Arial" panose="020B0604020202020204"/>
+                <a:cs typeface="Arial" panose="020B0604020202020204"/>
+              </a:rPr>
+              <a:t>Impaciente</a:t>
+            </a:r>
+            <a:endParaRPr sz="1800" dirty="0">
+              <a:latin typeface="Arial" panose="020B0604020202020204"/>
+              <a:cs typeface="Arial" panose="020B0604020202020204"/>
+            </a:endParaRPr>
           </a:p>
         </p:txBody>
       </p:sp>
       <p:sp>
         <p:nvSpPr>
-          <p:cNvPr id="17" name="Retângulo 16"/>
-          <p:cNvSpPr/>
+          <p:cNvPr id="12" name="object 12"/>
+          <p:cNvSpPr txBox="1"/>
           <p:nvPr/>
         </p:nvSpPr>
         <p:spPr>
           <a:xfrm>
-            <a:off x="928906" y="1513292"/>
-            <a:ext cx="5864577" cy="338554"/>
+            <a:off x="6983015" y="1612209"/>
+            <a:ext cx="3762502" cy="257175"/>
           </a:xfrm>
           <a:prstGeom prst="rect">
             <a:avLst/>
           </a:prstGeom>
         </p:spPr>
         <p:txBody>
-          <a:bodyPr wrap="square">
+          <a:bodyPr vert="horz" wrap="square" lIns="0" tIns="12059" rIns="0" bIns="0" rtlCol="0">
             <a:spAutoFit/>
           </a:bodyPr>
           <a:lstStyle/>
           <a:p>
-            <a:r>
-              <a:rPr lang="pt-BR" sz="1600" b="1" dirty="0">
+            <a:pPr>
+              <a:lnSpc>
+                <a:spcPct val="100000"/>
+              </a:lnSpc>
+              <a:spcBef>
+                <a:spcPts val="95"/>
+              </a:spcBef>
+            </a:pPr>
+            <a:r>
+              <a:rPr sz="1600" b="1" spc="-5" dirty="0">
                 <a:solidFill>
                   <a:srgbClr val="E6005A"/>
                 </a:solidFill>
-                <a:latin typeface="Exo 2" pitchFamily="50" charset="0"/>
+                <a:latin typeface="Arial" panose="020B0604020202020204"/>
+                <a:cs typeface="Arial" panose="020B0604020202020204"/>
               </a:rPr>
-              <a:t>Quem? Nome, foto e uma frase que especifique o problema</a:t>
-            </a:r>
-            <a:endParaRPr lang="pt-BR" sz="1600" b="1" dirty="0">
-              <a:solidFill>
-                <a:srgbClr val="E6005A"/>
-              </a:solidFill>
-              <a:latin typeface="Exo 2" pitchFamily="50" charset="0"/>
+              <a:t>Palavras/</a:t>
+            </a:r>
+            <a:r>
+              <a:rPr sz="1600" b="1" spc="-265" dirty="0">
+                <a:solidFill>
+                  <a:srgbClr val="E6005A"/>
+                </a:solidFill>
+                <a:latin typeface="Arial" panose="020B0604020202020204"/>
+                <a:cs typeface="Arial" panose="020B0604020202020204"/>
+              </a:rPr>
+              <a:t> </a:t>
+            </a:r>
+            <a:r>
+              <a:rPr sz="1600" b="1" spc="5" dirty="0">
+                <a:solidFill>
+                  <a:srgbClr val="E6005A"/>
+                </a:solidFill>
+                <a:latin typeface="Arial" panose="020B0604020202020204"/>
+                <a:cs typeface="Arial" panose="020B0604020202020204"/>
+              </a:rPr>
+              <a:t>frases</a:t>
+            </a:r>
+            <a:r>
+              <a:rPr sz="1600" b="1" spc="-80" dirty="0">
+                <a:solidFill>
+                  <a:srgbClr val="E6005A"/>
+                </a:solidFill>
+                <a:latin typeface="Arial" panose="020B0604020202020204"/>
+                <a:cs typeface="Arial" panose="020B0604020202020204"/>
+              </a:rPr>
+              <a:t> </a:t>
+            </a:r>
+            <a:r>
+              <a:rPr sz="1600" b="1" spc="-15" dirty="0">
+                <a:solidFill>
+                  <a:srgbClr val="E6005A"/>
+                </a:solidFill>
+                <a:latin typeface="Arial" panose="020B0604020202020204"/>
+                <a:cs typeface="Arial" panose="020B0604020202020204"/>
+              </a:rPr>
+              <a:t>que</a:t>
+            </a:r>
+            <a:r>
+              <a:rPr sz="1600" b="1" spc="-65" dirty="0">
+                <a:solidFill>
+                  <a:srgbClr val="E6005A"/>
+                </a:solidFill>
+                <a:latin typeface="Arial" panose="020B0604020202020204"/>
+                <a:cs typeface="Arial" panose="020B0604020202020204"/>
+              </a:rPr>
+              <a:t> </a:t>
+            </a:r>
+            <a:r>
+              <a:rPr sz="1600" b="1" dirty="0">
+                <a:solidFill>
+                  <a:srgbClr val="E6005A"/>
+                </a:solidFill>
+                <a:latin typeface="Arial" panose="020B0604020202020204"/>
+                <a:cs typeface="Arial" panose="020B0604020202020204"/>
+              </a:rPr>
+              <a:t>definem</a:t>
+            </a:r>
+            <a:r>
+              <a:rPr sz="1600" b="1" spc="-70" dirty="0">
+                <a:solidFill>
+                  <a:srgbClr val="E6005A"/>
+                </a:solidFill>
+                <a:latin typeface="Arial" panose="020B0604020202020204"/>
+                <a:cs typeface="Arial" panose="020B0604020202020204"/>
+              </a:rPr>
+              <a:t> </a:t>
+            </a:r>
+            <a:r>
+              <a:rPr sz="1600" b="1" spc="-5" dirty="0">
+                <a:solidFill>
+                  <a:srgbClr val="E6005A"/>
+                </a:solidFill>
+                <a:latin typeface="Arial" panose="020B0604020202020204"/>
+                <a:cs typeface="Arial" panose="020B0604020202020204"/>
+              </a:rPr>
+              <a:t>a</a:t>
+            </a:r>
+            <a:r>
+              <a:rPr sz="1600" b="1" spc="-85" dirty="0">
+                <a:solidFill>
+                  <a:srgbClr val="E6005A"/>
+                </a:solidFill>
+                <a:latin typeface="Arial" panose="020B0604020202020204"/>
+                <a:cs typeface="Arial" panose="020B0604020202020204"/>
+              </a:rPr>
+              <a:t> </a:t>
+            </a:r>
+            <a:r>
+              <a:rPr sz="1600" b="1" spc="-10" dirty="0">
+                <a:solidFill>
+                  <a:srgbClr val="E6005A"/>
+                </a:solidFill>
+                <a:latin typeface="Arial" panose="020B0604020202020204"/>
+                <a:cs typeface="Arial" panose="020B0604020202020204"/>
+              </a:rPr>
+              <a:t>persona</a:t>
+            </a:r>
+            <a:endParaRPr sz="1600">
+              <a:latin typeface="Arial" panose="020B0604020202020204"/>
+              <a:cs typeface="Arial" panose="020B0604020202020204"/>
             </a:endParaRPr>
           </a:p>
         </p:txBody>
       </p:sp>
       <p:sp>
         <p:nvSpPr>
-          <p:cNvPr id="18" name="Retângulo 17"/>
-          <p:cNvSpPr/>
+          <p:cNvPr id="13" name="object 13"/>
+          <p:cNvSpPr txBox="1"/>
           <p:nvPr/>
         </p:nvSpPr>
         <p:spPr>
           <a:xfrm>
-            <a:off x="6894605" y="1575817"/>
-            <a:ext cx="4097446" cy="338554"/>
+            <a:off x="929963" y="4356653"/>
+            <a:ext cx="11586452" cy="1696720"/>
+          </a:xfrm>
+          <a:prstGeom prst="rect">
+            <a:avLst/>
+          </a:prstGeom>
+          <a:ln w="25400">
+            <a:solidFill>
+              <a:srgbClr val="243746"/>
+            </a:solidFill>
+          </a:ln>
+        </p:spPr>
+        <p:txBody>
+          <a:bodyPr vert="horz" wrap="square" lIns="0" tIns="48237" rIns="0" bIns="0" rtlCol="0" anchor="t">
+            <a:spAutoFit/>
+          </a:bodyPr>
+          <a:lstStyle/>
+          <a:p>
+            <a:pPr marL="182245">
+              <a:lnSpc>
+                <a:spcPct val="100000"/>
+              </a:lnSpc>
+              <a:spcBef>
+                <a:spcPts val="380"/>
+              </a:spcBef>
+            </a:pPr>
+            <a:r>
+              <a:rPr sz="1600" b="1" spc="-15" dirty="0">
+                <a:solidFill>
+                  <a:srgbClr val="E6005A"/>
+                </a:solidFill>
+                <a:latin typeface="Arial" panose="020B0604020202020204"/>
+                <a:cs typeface="Arial" panose="020B0604020202020204"/>
+              </a:rPr>
+              <a:t>Dores </a:t>
+            </a:r>
+            <a:r>
+              <a:rPr sz="1600" b="1" spc="-5" dirty="0">
+                <a:solidFill>
+                  <a:srgbClr val="E6005A"/>
+                </a:solidFill>
+                <a:latin typeface="Arial" panose="020B0604020202020204"/>
+                <a:cs typeface="Arial" panose="020B0604020202020204"/>
+              </a:rPr>
+              <a:t>e</a:t>
+            </a:r>
+            <a:r>
+              <a:rPr sz="1600" b="1" spc="-200" dirty="0">
+                <a:solidFill>
+                  <a:srgbClr val="E6005A"/>
+                </a:solidFill>
+                <a:latin typeface="Arial" panose="020B0604020202020204"/>
+                <a:cs typeface="Arial" panose="020B0604020202020204"/>
+              </a:rPr>
+              <a:t> </a:t>
+            </a:r>
+            <a:r>
+              <a:rPr sz="1600" b="1" spc="-20" dirty="0">
+                <a:solidFill>
+                  <a:srgbClr val="E6005A"/>
+                </a:solidFill>
+                <a:latin typeface="Arial" panose="020B0604020202020204"/>
+                <a:cs typeface="Arial" panose="020B0604020202020204"/>
+              </a:rPr>
+              <a:t>Necessidades</a:t>
+            </a:r>
+            <a:endParaRPr sz="1600">
+              <a:latin typeface="Arial" panose="020B0604020202020204"/>
+              <a:cs typeface="Arial" panose="020B0604020202020204"/>
+            </a:endParaRPr>
+          </a:p>
+          <a:p>
+            <a:pPr marL="424180" indent="-343535">
+              <a:spcBef>
+                <a:spcPts val="860"/>
+              </a:spcBef>
+              <a:buChar char="•"/>
+              <a:tabLst>
+                <a:tab pos="423545" algn="l"/>
+                <a:tab pos="424815" algn="l"/>
+              </a:tabLst>
+            </a:pPr>
+            <a:r>
+              <a:rPr lang="pt-BR" spc="-15" dirty="0">
+                <a:latin typeface="Arial" panose="020B0604020202020204"/>
+                <a:cs typeface="Arial" panose="020B0604020202020204"/>
+              </a:rPr>
+              <a:t>Necessita de apoio para a tarefas diárias. </a:t>
+            </a:r>
+            <a:endParaRPr lang="pt-BR" sz="1800" spc="-15" dirty="0">
+              <a:latin typeface="Arial" panose="020B0604020202020204"/>
+              <a:cs typeface="Arial" panose="020B0604020202020204"/>
+            </a:endParaRPr>
+          </a:p>
+          <a:p>
+            <a:pPr marL="424180" indent="-343535">
+              <a:buChar char="•"/>
+              <a:tabLst>
+                <a:tab pos="424180" algn="l"/>
+                <a:tab pos="424815" algn="l"/>
+              </a:tabLst>
+            </a:pPr>
+            <a:r>
+              <a:rPr lang="pt-BR" dirty="0">
+                <a:latin typeface="Arial" panose="020B0604020202020204"/>
+                <a:cs typeface="Arial" panose="020B0604020202020204"/>
+                <a:sym typeface="+mn-ea"/>
+              </a:rPr>
+              <a:t>Diaristas </a:t>
+            </a:r>
+            <a:r>
+              <a:rPr lang="pt-PT" altLang="pt-BR" sz="2000" dirty="0">
+                <a:latin typeface="Arial" panose="020B0604020202020204"/>
+                <a:cs typeface="Arial" panose="020B0604020202020204"/>
+                <a:sym typeface="+mn-ea"/>
+              </a:rPr>
+              <a:t>que</a:t>
+            </a:r>
+            <a:r>
+              <a:rPr lang="pt-BR" sz="2000" dirty="0">
+                <a:latin typeface="Arial" panose="020B0604020202020204"/>
+                <a:cs typeface="Arial" panose="020B0604020202020204"/>
+                <a:sym typeface="+mn-ea"/>
+              </a:rPr>
+              <a:t> </a:t>
+            </a:r>
+            <a:r>
+              <a:rPr lang="pt-BR" dirty="0">
+                <a:latin typeface="Arial" panose="020B0604020202020204"/>
+                <a:cs typeface="Arial" panose="020B0604020202020204"/>
+                <a:sym typeface="+mn-ea"/>
+              </a:rPr>
+              <a:t>não c</a:t>
+            </a:r>
+            <a:r>
+              <a:rPr lang="pt-PT" altLang="pt-BR" dirty="0">
+                <a:latin typeface="Arial" panose="020B0604020202020204"/>
+                <a:cs typeface="Arial" panose="020B0604020202020204"/>
+                <a:sym typeface="+mn-ea"/>
+              </a:rPr>
+              <a:t>umprem</a:t>
+            </a:r>
+            <a:r>
+              <a:rPr lang="pt-BR" dirty="0">
+                <a:latin typeface="Arial" panose="020B0604020202020204"/>
+                <a:cs typeface="Arial" panose="020B0604020202020204"/>
+                <a:sym typeface="+mn-ea"/>
+              </a:rPr>
+              <a:t> </a:t>
+            </a:r>
+            <a:r>
+              <a:rPr lang="pt-PT" altLang="pt-BR" dirty="0">
+                <a:latin typeface="Arial" panose="020B0604020202020204"/>
+                <a:cs typeface="Arial" panose="020B0604020202020204"/>
+                <a:sym typeface="+mn-ea"/>
+              </a:rPr>
+              <a:t>o que foi </a:t>
+            </a:r>
+            <a:r>
+              <a:rPr lang="pt-BR" dirty="0">
+                <a:latin typeface="Arial" panose="020B0604020202020204"/>
+                <a:cs typeface="Arial" panose="020B0604020202020204"/>
+                <a:sym typeface="+mn-ea"/>
+              </a:rPr>
+              <a:t>combinado</a:t>
+            </a:r>
+            <a:endParaRPr lang="pt-BR" sz="1800" dirty="0">
+              <a:latin typeface="Arial" panose="020B0604020202020204"/>
+              <a:cs typeface="Arial" panose="020B0604020202020204"/>
+            </a:endParaRPr>
+          </a:p>
+          <a:p>
+            <a:pPr marL="424180" indent="-343535">
+              <a:buFont typeface="Arial" panose="020B0604020202020204"/>
+              <a:buChar char="•"/>
+              <a:tabLst>
+                <a:tab pos="424180" algn="l"/>
+                <a:tab pos="424815" algn="l"/>
+              </a:tabLst>
+            </a:pPr>
+            <a:r>
+              <a:rPr lang="pt-BR" spc="-15" dirty="0">
+                <a:latin typeface="Arial" panose="020B0604020202020204"/>
+                <a:cs typeface="Arial" panose="020B0604020202020204"/>
+              </a:rPr>
+              <a:t>Não gosta ou não tem tempo para a atividade</a:t>
+            </a:r>
+            <a:endParaRPr lang="pt-BR" sz="1800" spc="-15" dirty="0">
+              <a:latin typeface="Arial" panose="020B0604020202020204"/>
+              <a:cs typeface="Arial" panose="020B0604020202020204"/>
+            </a:endParaRPr>
+          </a:p>
+          <a:p>
+            <a:pPr marL="424180" indent="-343535">
+              <a:buFont typeface="Arial" panose="020B0604020202020204"/>
+              <a:buChar char="•"/>
+              <a:tabLst>
+                <a:tab pos="424180" algn="l"/>
+                <a:tab pos="424815" algn="l"/>
+              </a:tabLst>
+            </a:pPr>
+            <a:r>
+              <a:rPr lang="pt-BR" spc="-85" dirty="0">
+                <a:latin typeface="Arial" panose="020B0604020202020204"/>
+                <a:cs typeface="Arial" panose="020B0604020202020204"/>
+              </a:rPr>
+              <a:t>Precisa de uma grande disponibilidade </a:t>
+            </a:r>
+            <a:endParaRPr sz="1800" dirty="0">
+              <a:latin typeface="Arial" panose="020B0604020202020204"/>
+              <a:cs typeface="Arial" panose="020B0604020202020204"/>
+            </a:endParaRPr>
+          </a:p>
+        </p:txBody>
+      </p:sp>
+      <p:sp>
+        <p:nvSpPr>
+          <p:cNvPr id="14" name="object 14"/>
+          <p:cNvSpPr txBox="1"/>
+          <p:nvPr/>
+        </p:nvSpPr>
+        <p:spPr>
+          <a:xfrm>
+            <a:off x="13129362" y="7235602"/>
+            <a:ext cx="114881" cy="205105"/>
           </a:xfrm>
           <a:prstGeom prst="rect">
             <a:avLst/>
           </a:prstGeom>
         </p:spPr>
         <p:txBody>
-          <a:bodyPr wrap="square">
+          <a:bodyPr vert="horz" wrap="square" lIns="0" tIns="13963" rIns="0" bIns="0" rtlCol="0">
             <a:spAutoFit/>
           </a:bodyPr>
           <a:lstStyle/>
           <a:p>
-            <a:r>
-              <a:rPr lang="pt-BR" sz="1600" b="1" dirty="0">
+            <a:pPr marL="12700">
+              <a:lnSpc>
+                <a:spcPct val="100000"/>
+              </a:lnSpc>
+              <a:spcBef>
+                <a:spcPts val="110"/>
+              </a:spcBef>
+            </a:pPr>
+            <a:r>
+              <a:rPr sz="1250" b="1" spc="5" dirty="0">
                 <a:solidFill>
-                  <a:srgbClr val="E6005A"/>
+                  <a:srgbClr val="FFFFFF"/>
                 </a:solidFill>
-                <a:latin typeface="Exo 2" pitchFamily="50" charset="0"/>
+                <a:latin typeface="Arial" panose="020B0604020202020204"/>
+                <a:cs typeface="Arial" panose="020B0604020202020204"/>
               </a:rPr>
-              <a:t>Palavras/frases que definem a persona</a:t>
-            </a:r>
-            <a:endParaRPr lang="pt-BR" sz="1600" b="1" dirty="0">
-              <a:solidFill>
-                <a:srgbClr val="E6005A"/>
-              </a:solidFill>
-              <a:latin typeface="Exo 2" pitchFamily="50" charset="0"/>
+              <a:t>1</a:t>
+            </a:r>
+            <a:endParaRPr sz="1250">
+              <a:latin typeface="Arial" panose="020B0604020202020204"/>
+              <a:cs typeface="Arial" panose="020B0604020202020204"/>
             </a:endParaRPr>
           </a:p>
         </p:txBody>
       </p:sp>
       <p:sp>
         <p:nvSpPr>
-          <p:cNvPr id="19" name="Retângulo 18"/>
+          <p:cNvPr id="16" name="object 4"/>
           <p:cNvSpPr/>
           <p:nvPr/>
         </p:nvSpPr>
         <p:spPr>
           <a:xfrm>
-            <a:off x="1021878" y="4356695"/>
-            <a:ext cx="2819277" cy="338554"/>
+            <a:off x="929033" y="1406058"/>
+            <a:ext cx="5756731" cy="2877731"/>
+          </a:xfrm>
+          <a:custGeom>
+            <a:avLst/>
+            <a:gdLst/>
+            <a:ahLst/>
+            <a:cxnLst/>
+            <a:rect l="l" t="t" r="r" b="b"/>
+            <a:pathLst>
+              <a:path w="5759450" h="2879090">
+                <a:moveTo>
+                  <a:pt x="0" y="2878836"/>
+                </a:moveTo>
+                <a:lnTo>
+                  <a:pt x="5759196" y="2878836"/>
+                </a:lnTo>
+                <a:lnTo>
+                  <a:pt x="5759196" y="0"/>
+                </a:lnTo>
+                <a:lnTo>
+                  <a:pt x="0" y="0"/>
+                </a:lnTo>
+                <a:lnTo>
+                  <a:pt x="0" y="2878836"/>
+                </a:lnTo>
+                <a:close/>
+              </a:path>
+            </a:pathLst>
+          </a:custGeom>
+          <a:ln w="25400">
+            <a:solidFill>
+              <a:srgbClr val="243746"/>
+            </a:solidFill>
+          </a:ln>
+        </p:spPr>
+        <p:txBody>
+          <a:bodyPr wrap="square" lIns="0" tIns="0" rIns="0" bIns="0" rtlCol="0"/>
+          <a:lstStyle/>
+          <a:p/>
+        </p:txBody>
+      </p:sp>
+      <p:sp>
+        <p:nvSpPr>
+          <p:cNvPr id="19" name="object 12"/>
+          <p:cNvSpPr txBox="1"/>
+          <p:nvPr/>
+        </p:nvSpPr>
+        <p:spPr>
+          <a:xfrm>
+            <a:off x="1099518" y="1517057"/>
+            <a:ext cx="5581688" cy="503555"/>
           </a:xfrm>
           <a:prstGeom prst="rect">
             <a:avLst/>
           </a:prstGeom>
         </p:spPr>
         <p:txBody>
-          <a:bodyPr wrap="square">
+          <a:bodyPr vert="horz" wrap="square" lIns="0" tIns="12059" rIns="0" bIns="0" rtlCol="0" anchor="t">
             <a:spAutoFit/>
           </a:bodyPr>
           <a:lstStyle/>
           <a:p>
-            <a:r>
-              <a:rPr lang="pt-BR" sz="1600" b="1">
+            <a:pPr>
+              <a:spcBef>
+                <a:spcPts val="95"/>
+              </a:spcBef>
+            </a:pPr>
+            <a:r>
+              <a:rPr lang="pt-BR" sz="1600" b="1" spc="-5" dirty="0">
                 <a:solidFill>
                   <a:srgbClr val="E6005A"/>
                 </a:solidFill>
-                <a:latin typeface="Exo 2" pitchFamily="50" charset="0"/>
+                <a:latin typeface="Arial" panose="020B0604020202020204"/>
+                <a:cs typeface="Arial" panose="020B0604020202020204"/>
               </a:rPr>
-              <a:t>Dores e Necessidades</a:t>
-            </a:r>
-            <a:endParaRPr lang="pt-BR" sz="1600" b="1">
+              <a:t>Quem ? Nome, foto e uma frase que especifica o problema</a:t>
+            </a:r>
+            <a:endParaRPr lang="pt-BR" sz="1600" b="1" spc="-5" dirty="0">
               <a:solidFill>
                 <a:srgbClr val="E6005A"/>
               </a:solidFill>
-              <a:latin typeface="Exo 2" pitchFamily="50" charset="0"/>
+              <a:latin typeface="Arial" panose="020B0604020202020204"/>
+              <a:cs typeface="Arial" panose="020B0604020202020204"/>
             </a:endParaRPr>
           </a:p>
         </p:txBody>
       </p:sp>
+      <p:pic>
+        <p:nvPicPr>
+          <p:cNvPr id="20" name="Imagem 20" descr="Mulher com cabelos longos&#10;&#10;Descrição gerada automaticamente"/>
+          <p:cNvPicPr>
+            <a:picLocks noChangeAspect="1"/>
+          </p:cNvPicPr>
+          <p:nvPr/>
+        </p:nvPicPr>
+        <p:blipFill>
+          <a:blip r:embed="rId2"/>
+          <a:stretch>
+            <a:fillRect/>
+          </a:stretch>
+        </p:blipFill>
+        <p:spPr>
+          <a:xfrm>
+            <a:off x="1100853" y="2317988"/>
+            <a:ext cx="2743008" cy="1656278"/>
+          </a:xfrm>
+          <a:prstGeom prst="rect">
+            <a:avLst/>
+          </a:prstGeom>
+        </p:spPr>
+      </p:pic>
       <p:sp>
         <p:nvSpPr>
-          <p:cNvPr id="14" name="Retângulo 13"/>
-          <p:cNvSpPr/>
+          <p:cNvPr id="21" name="object 10"/>
+          <p:cNvSpPr txBox="1"/>
           <p:nvPr/>
         </p:nvSpPr>
         <p:spPr>
           <a:xfrm>
-            <a:off x="920757" y="4712667"/>
-            <a:ext cx="10430866" cy="1754326"/>
+            <a:off x="4024293" y="2157840"/>
+            <a:ext cx="2502898" cy="1976755"/>
           </a:xfrm>
           <a:prstGeom prst="rect">
             <a:avLst/>
           </a:prstGeom>
         </p:spPr>
         <p:txBody>
-          <a:bodyPr wrap="square">
+          <a:bodyPr vert="horz" wrap="square" lIns="0" tIns="12694" rIns="0" bIns="0" rtlCol="0" anchor="t">
             <a:spAutoFit/>
           </a:bodyPr>
           <a:lstStyle/>
           <a:p>
-            <a:pPr marL="342900" indent="-342900">
-              <a:buFont typeface="Arial" panose="020B0604020202020204" pitchFamily="34" charset="0"/>
-              <a:buChar char="•"/>
+            <a:pPr>
+              <a:spcBef>
+                <a:spcPts val="100"/>
+              </a:spcBef>
+              <a:tabLst>
+                <a:tab pos="341630" algn="l"/>
+                <a:tab pos="342265" algn="l"/>
+              </a:tabLst>
             </a:pPr>
             <a:r>
-              <a:rPr lang="pt-BR" sz="1800" dirty="0">
-                <a:latin typeface="Exo 2" pitchFamily="50" charset="0"/>
+              <a:rPr lang="pt-BR" spc="-10" dirty="0">
+                <a:latin typeface="Arial" panose="020B0604020202020204"/>
+                <a:cs typeface="Arial" panose="020B0604020202020204"/>
               </a:rPr>
-              <a:t>Precisa de apoio para limpeza de apartamento (1x por semana)</a:t>
-            </a:r>
-            <a:endParaRPr lang="pt-BR" sz="1800" dirty="0">
-              <a:latin typeface="Exo 2" pitchFamily="50" charset="0"/>
+              <a:t>Dulce </a:t>
+            </a:r>
+            <a:endParaRPr lang="pt-BR" spc="-10" dirty="0">
+              <a:latin typeface="Arial" panose="020B0604020202020204"/>
+              <a:cs typeface="Arial" panose="020B0604020202020204"/>
             </a:endParaRPr>
           </a:p>
           <a:p>
-            <a:pPr marL="342900" indent="-342900">
-              <a:buFont typeface="Arial" panose="020B0604020202020204" pitchFamily="34" charset="0"/>
-              <a:buChar char="•"/>
+            <a:pPr>
+              <a:spcBef>
+                <a:spcPts val="100"/>
+              </a:spcBef>
+              <a:tabLst>
+                <a:tab pos="341630" algn="l"/>
+                <a:tab pos="342265" algn="l"/>
+              </a:tabLst>
             </a:pPr>
-            <a:r>
-              <a:rPr lang="pt-BR" sz="1800" dirty="0">
-                <a:latin typeface="Exo 2" pitchFamily="50" charset="0"/>
+            <a:endParaRPr lang="pt-BR" spc="-10" dirty="0">
+              <a:latin typeface="Arial" panose="020B0604020202020204"/>
+              <a:cs typeface="Arial" panose="020B0604020202020204"/>
+            </a:endParaRPr>
+          </a:p>
+          <a:p>
+            <a:pPr>
+              <a:spcBef>
+                <a:spcPts val="100"/>
+              </a:spcBef>
+              <a:tabLst>
+                <a:tab pos="341630" algn="l"/>
+                <a:tab pos="342265" algn="l"/>
+              </a:tabLst>
+            </a:pPr>
+            <a:r>
+              <a:rPr lang="pt-BR" sz="1600" spc="-10" dirty="0">
+                <a:latin typeface="Arial" panose="020B0604020202020204"/>
+                <a:cs typeface="Arial" panose="020B0604020202020204"/>
               </a:rPr>
-              <a:t>As diaristas atrasam, faltam, sem explicações</a:t>
-            </a:r>
-            <a:endParaRPr lang="pt-BR" sz="1800" dirty="0">
-              <a:latin typeface="Exo 2" pitchFamily="50" charset="0"/>
-            </a:endParaRPr>
-          </a:p>
-          <a:p>
-            <a:pPr marL="342900" indent="-342900">
-              <a:buFont typeface="Arial" panose="020B0604020202020204" pitchFamily="34" charset="0"/>
-              <a:buChar char="•"/>
-            </a:pPr>
-            <a:r>
-              <a:rPr lang="pt-BR" sz="1800" dirty="0">
-                <a:latin typeface="Exo 2" pitchFamily="50" charset="0"/>
+              <a:t>"</a:t>
+            </a:r>
+            <a:r>
+              <a:rPr lang="pt-BR" spc="-10" dirty="0">
+                <a:latin typeface="Arial" panose="020B0604020202020204"/>
+                <a:cs typeface="Arial" panose="020B0604020202020204"/>
               </a:rPr>
-              <a:t>Tem uma diarista de confiança mas que nem sempre consegue agenda</a:t>
-            </a:r>
-            <a:endParaRPr lang="pt-BR" sz="1800" dirty="0">
-              <a:latin typeface="Exo 2" pitchFamily="50" charset="0"/>
-            </a:endParaRPr>
-          </a:p>
-          <a:p>
-            <a:pPr marL="342900" indent="-342900">
-              <a:buFont typeface="Arial" panose="020B0604020202020204" pitchFamily="34" charset="0"/>
-              <a:buChar char="•"/>
-            </a:pPr>
-            <a:r>
-              <a:rPr lang="pt-BR" sz="1800" dirty="0">
-                <a:latin typeface="Exo 2" pitchFamily="50" charset="0"/>
-              </a:rPr>
-              <a:t>Não gosta de passar de roupa</a:t>
-            </a:r>
-            <a:endParaRPr lang="pt-BR" sz="1800" dirty="0">
-              <a:latin typeface="Exo 2" pitchFamily="50" charset="0"/>
-            </a:endParaRPr>
-          </a:p>
-          <a:p>
-            <a:pPr marL="342900" indent="-342900">
-              <a:buFont typeface="Arial" panose="020B0604020202020204" pitchFamily="34" charset="0"/>
-              <a:buChar char="•"/>
-            </a:pPr>
-            <a:r>
-              <a:rPr lang="pt-BR" sz="1800" dirty="0">
-                <a:latin typeface="Exo 2" pitchFamily="50" charset="0"/>
-              </a:rPr>
-              <a:t>Tem orçamento limitado para a atividade</a:t>
-            </a:r>
-            <a:endParaRPr lang="pt-BR" sz="1800" dirty="0">
-              <a:latin typeface="Exo 2" pitchFamily="50" charset="0"/>
-            </a:endParaRPr>
-          </a:p>
-          <a:p>
-            <a:pPr marL="342900" indent="-342900">
-              <a:buFont typeface="Arial" panose="020B0604020202020204" pitchFamily="34" charset="0"/>
-              <a:buChar char="•"/>
-            </a:pPr>
-            <a:r>
-              <a:rPr lang="pt-BR" sz="1800" dirty="0">
-                <a:latin typeface="Exo 2" pitchFamily="50" charset="0"/>
-              </a:rPr>
-              <a:t>? Tem alguma deficiência?  Aguarde a aula sobre isso...</a:t>
-            </a:r>
-            <a:endParaRPr lang="pt-BR" sz="1800" dirty="0">
-              <a:latin typeface="Exo 2" pitchFamily="50" charset="0"/>
+              <a:t>Minha vida é super corrida não tenho tempo para arrumar a casa."</a:t>
+            </a:r>
+            <a:endParaRPr lang="pt-BR" spc="-10" dirty="0">
+              <a:latin typeface="Arial" panose="020B0604020202020204"/>
+              <a:cs typeface="Arial" panose="020B0604020202020204"/>
             </a:endParaRPr>
           </a:p>
         </p:txBody>
       </p:sp>
-      <p:sp>
-        <p:nvSpPr>
-          <p:cNvPr id="20" name="Espaço Reservado para Número de Slide 2"/>
-          <p:cNvSpPr txBox="1"/>
-          <p:nvPr/>
-        </p:nvSpPr>
-        <p:spPr bwMode="auto">
-          <a:xfrm>
-            <a:off x="12605478" y="7237015"/>
-            <a:ext cx="628646" cy="214290"/>
-          </a:xfrm>
-          <a:prstGeom prst="rect">
-            <a:avLst/>
-          </a:prstGeom>
-          <a:noFill/>
-          <a:ln w="9525">
-            <a:noFill/>
-            <a:miter lim="800000"/>
-          </a:ln>
-          <a:effectLst/>
-        </p:spPr>
-        <p:txBody>
-          <a:bodyPr vert="horz" wrap="square" lIns="18000" tIns="10800" rIns="18000" bIns="10800" numCol="1" anchor="t" anchorCtr="0" compatLnSpc="1"/>
-          <a:lstStyle>
-            <a:defPPr>
-              <a:defRPr lang="pt-BR"/>
-            </a:defPPr>
-            <a:lvl1pPr marL="0" algn="r" defTabSz="1043305" rtl="0" eaLnBrk="1" latinLnBrk="0" hangingPunct="1">
-              <a:spcBef>
-                <a:spcPct val="0"/>
-              </a:spcBef>
-              <a:spcAft>
-                <a:spcPct val="0"/>
-              </a:spcAft>
-              <a:defRPr sz="1255" b="1" kern="1200">
-                <a:solidFill>
-                  <a:schemeClr val="bg1"/>
-                </a:solidFill>
-                <a:latin typeface="Exo 2" pitchFamily="50" charset="0"/>
-                <a:ea typeface="Tahoma" pitchFamily="34" charset="0"/>
-                <a:cs typeface="Tahoma" pitchFamily="34" charset="0"/>
-              </a:defRPr>
-            </a:lvl1pPr>
-            <a:lvl2pPr marL="521335" algn="l" defTabSz="1043305" rtl="0" eaLnBrk="1" latinLnBrk="0" hangingPunct="1">
-              <a:defRPr sz="2100" kern="1200">
-                <a:solidFill>
-                  <a:schemeClr val="tx1"/>
-                </a:solidFill>
-                <a:latin typeface="+mn-lt"/>
-                <a:ea typeface="+mn-ea"/>
-                <a:cs typeface="+mn-cs"/>
-              </a:defRPr>
-            </a:lvl2pPr>
-            <a:lvl3pPr marL="1043305" algn="l" defTabSz="1043305" rtl="0" eaLnBrk="1" latinLnBrk="0" hangingPunct="1">
-              <a:defRPr sz="2100" kern="1200">
-                <a:solidFill>
-                  <a:schemeClr val="tx1"/>
-                </a:solidFill>
-                <a:latin typeface="+mn-lt"/>
-                <a:ea typeface="+mn-ea"/>
-                <a:cs typeface="+mn-cs"/>
-              </a:defRPr>
-            </a:lvl3pPr>
-            <a:lvl4pPr marL="1564640" algn="l" defTabSz="1043305" rtl="0" eaLnBrk="1" latinLnBrk="0" hangingPunct="1">
-              <a:defRPr sz="2100" kern="1200">
-                <a:solidFill>
-                  <a:schemeClr val="tx1"/>
-                </a:solidFill>
-                <a:latin typeface="+mn-lt"/>
-                <a:ea typeface="+mn-ea"/>
-                <a:cs typeface="+mn-cs"/>
-              </a:defRPr>
-            </a:lvl4pPr>
-            <a:lvl5pPr marL="2085975" algn="l" defTabSz="1043305" rtl="0" eaLnBrk="1" latinLnBrk="0" hangingPunct="1">
-              <a:defRPr sz="2100" kern="1200">
-                <a:solidFill>
-                  <a:schemeClr val="tx1"/>
-                </a:solidFill>
-                <a:latin typeface="+mn-lt"/>
-                <a:ea typeface="+mn-ea"/>
-                <a:cs typeface="+mn-cs"/>
-              </a:defRPr>
-            </a:lvl5pPr>
-            <a:lvl6pPr marL="2607945" algn="l" defTabSz="1043305" rtl="0" eaLnBrk="1" latinLnBrk="0" hangingPunct="1">
-              <a:defRPr sz="2100" kern="1200">
-                <a:solidFill>
-                  <a:schemeClr val="tx1"/>
-                </a:solidFill>
-                <a:latin typeface="+mn-lt"/>
-                <a:ea typeface="+mn-ea"/>
-                <a:cs typeface="+mn-cs"/>
-              </a:defRPr>
-            </a:lvl6pPr>
-            <a:lvl7pPr marL="3129280" algn="l" defTabSz="1043305" rtl="0" eaLnBrk="1" latinLnBrk="0" hangingPunct="1">
-              <a:defRPr sz="2100" kern="1200">
-                <a:solidFill>
-                  <a:schemeClr val="tx1"/>
-                </a:solidFill>
-                <a:latin typeface="+mn-lt"/>
-                <a:ea typeface="+mn-ea"/>
-                <a:cs typeface="+mn-cs"/>
-              </a:defRPr>
-            </a:lvl7pPr>
-            <a:lvl8pPr marL="3650615" algn="l" defTabSz="1043305" rtl="0" eaLnBrk="1" latinLnBrk="0" hangingPunct="1">
-              <a:defRPr sz="2100" kern="1200">
-                <a:solidFill>
-                  <a:schemeClr val="tx1"/>
-                </a:solidFill>
-                <a:latin typeface="+mn-lt"/>
-                <a:ea typeface="+mn-ea"/>
-                <a:cs typeface="+mn-cs"/>
-              </a:defRPr>
-            </a:lvl8pPr>
-            <a:lvl9pPr marL="4171950" algn="l" defTabSz="1043305" rtl="0" eaLnBrk="1" latinLnBrk="0" hangingPunct="1">
-              <a:defRPr sz="2100" kern="1200">
-                <a:solidFill>
-                  <a:schemeClr val="tx1"/>
-                </a:solidFill>
-                <a:latin typeface="+mn-lt"/>
-                <a:ea typeface="+mn-ea"/>
-                <a:cs typeface="+mn-cs"/>
-              </a:defRPr>
-            </a:lvl9pPr>
-          </a:lstStyle>
-          <a:p>
-            <a:pPr>
-              <a:defRPr/>
-            </a:pPr>
-            <a:r>
-              <a:rPr lang="pt-BR"/>
-              <a:t>1</a:t>
-            </a:r>
-            <a:endParaRPr lang="pt-BR" sz="880"/>
-          </a:p>
-        </p:txBody>
-      </p:sp>
-      <p:pic>
-        <p:nvPicPr>
-          <p:cNvPr id="23" name="Picture 2" descr="Menina Foto gratuita"/>
-          <p:cNvPicPr>
-            <a:picLocks noChangeAspect="1" noChangeArrowheads="1"/>
-          </p:cNvPicPr>
-          <p:nvPr/>
-        </p:nvPicPr>
-        <p:blipFill rotWithShape="1">
-          <a:blip r:embed="rId1" cstate="email"/>
-          <a:srcRect/>
-          <a:stretch>
-            <a:fillRect/>
-          </a:stretch>
-        </p:blipFill>
-        <p:spPr bwMode="auto">
-          <a:xfrm>
-            <a:off x="1052612" y="1869264"/>
-            <a:ext cx="1720043" cy="2149814"/>
-          </a:xfrm>
-          <a:prstGeom prst="rect">
-            <a:avLst/>
-          </a:prstGeom>
-          <a:noFill/>
-          <a:extLst>
-            <a:ext uri="{909E8E84-426E-40DD-AFC4-6F175D3DCCD1}">
-              <a14:hiddenFill xmlns:a14="http://schemas.microsoft.com/office/drawing/2010/main">
-                <a:solidFill>
-                  <a:srgbClr val="FFFFFF"/>
-                </a:solidFill>
-              </a14:hiddenFill>
-            </a:ext>
-          </a:extLst>
-        </p:spPr>
-      </p:pic>
     </p:spTree>
   </p:cSld>
   <p:clrMapOvr>
@@ -17673,837 +18325,979 @@
       </p:grpSpPr>
       <p:sp>
         <p:nvSpPr>
-          <p:cNvPr id="3" name="Espaço Reservado para Número de Slide 2"/>
-          <p:cNvSpPr>
-            <a:spLocks noGrp="1"/>
-          </p:cNvSpPr>
-          <p:nvPr>
-            <p:ph type="sldNum" sz="quarter" idx="4"/>
-          </p:nvPr>
-        </p:nvSpPr>
-        <p:spPr>
-          <a:xfrm>
-            <a:off x="11925477" y="7237015"/>
-            <a:ext cx="628646" cy="214290"/>
-          </a:xfrm>
-        </p:spPr>
-        <p:txBody>
-          <a:bodyPr/>
-          <a:lstStyle/>
-          <a:p>
-            <a:pPr>
-              <a:defRPr/>
-            </a:pPr>
-            <a:fld id="{B66251D2-9488-44CD-87B4-F793A73C4A01}" type="slidenum">
-              <a:rPr lang="pt-BR" smtClean="0"/>
-            </a:fld>
-            <a:endParaRPr lang="pt-BR" sz="880"/>
-          </a:p>
-        </p:txBody>
-      </p:sp>
-      <p:sp>
-        <p:nvSpPr>
-          <p:cNvPr id="4" name="Espaço Reservado para Texto 3"/>
-          <p:cNvSpPr>
-            <a:spLocks noGrp="1"/>
-          </p:cNvSpPr>
-          <p:nvPr>
-            <p:ph type="body" sz="quarter" idx="13"/>
-          </p:nvPr>
-        </p:nvSpPr>
-        <p:spPr/>
-        <p:txBody>
-          <a:bodyPr/>
-          <a:lstStyle/>
-          <a:p>
-            <a:r>
-              <a:rPr lang="pt-BR" dirty="0"/>
-              <a:t>2. </a:t>
-            </a:r>
-            <a:r>
-              <a:rPr lang="pt-BR" dirty="0" err="1"/>
-              <a:t>Proto-Persona</a:t>
-            </a:r>
-            <a:r>
-              <a:rPr lang="pt-BR" dirty="0"/>
-              <a:t> 1 – Usuário/Necessidades</a:t>
-            </a:r>
-            <a:endParaRPr lang="pt-BR" dirty="0"/>
-          </a:p>
-        </p:txBody>
-      </p:sp>
-      <p:sp>
-        <p:nvSpPr>
-          <p:cNvPr id="6" name="Retângulo 5"/>
+          <p:cNvPr id="2" name="object 2"/>
           <p:cNvSpPr/>
           <p:nvPr/>
         </p:nvSpPr>
         <p:spPr>
           <a:xfrm>
-            <a:off x="929546" y="1404367"/>
-            <a:ext cx="5760000" cy="2880000"/>
+            <a:off x="5991316" y="154938"/>
+            <a:ext cx="536195" cy="574277"/>
           </a:xfrm>
           <a:prstGeom prst="rect">
             <a:avLst/>
           </a:prstGeom>
-          <a:noFill/>
-          <a:ln>
-            <a:solidFill>
-              <a:srgbClr val="253746"/>
-            </a:solidFill>
-          </a:ln>
+          <a:blipFill>
+            <a:blip r:embed="rId1" cstate="print"/>
+            <a:stretch>
+              <a:fillRect/>
+            </a:stretch>
+          </a:blipFill>
         </p:spPr>
-        <p:style>
-          <a:lnRef idx="2">
-            <a:schemeClr val="accent1">
-              <a:shade val="50000"/>
-            </a:schemeClr>
-          </a:lnRef>
-          <a:fillRef idx="1">
-            <a:schemeClr val="accent1"/>
-          </a:fillRef>
-          <a:effectRef idx="0">
-            <a:schemeClr val="accent1"/>
-          </a:effectRef>
-          <a:fontRef idx="minor">
-            <a:schemeClr val="lt1"/>
-          </a:fontRef>
-        </p:style>
         <p:txBody>
-          <a:bodyPr rtlCol="0" anchor="ctr"/>
+          <a:bodyPr wrap="square" lIns="0" tIns="0" rIns="0" bIns="0" rtlCol="0"/>
           <a:lstStyle/>
-          <a:p>
-            <a:pPr algn="ctr"/>
-            <a:endParaRPr lang="pt-BR"/>
-          </a:p>
+          <a:p/>
         </p:txBody>
       </p:sp>
       <p:sp>
         <p:nvSpPr>
-          <p:cNvPr id="7" name="Retângulo 6"/>
-          <p:cNvSpPr/>
-          <p:nvPr/>
-        </p:nvSpPr>
-        <p:spPr>
-          <a:xfrm>
-            <a:off x="929546" y="4356975"/>
-            <a:ext cx="11592008" cy="2056888"/>
-          </a:xfrm>
-          <a:prstGeom prst="rect">
-            <a:avLst/>
-          </a:prstGeom>
-          <a:noFill/>
-          <a:ln>
-            <a:solidFill>
-              <a:srgbClr val="253746"/>
-            </a:solidFill>
-          </a:ln>
-        </p:spPr>
-        <p:style>
-          <a:lnRef idx="2">
-            <a:schemeClr val="accent1">
-              <a:shade val="50000"/>
-            </a:schemeClr>
-          </a:lnRef>
-          <a:fillRef idx="1">
-            <a:schemeClr val="accent1"/>
-          </a:fillRef>
-          <a:effectRef idx="0">
-            <a:schemeClr val="accent1"/>
-          </a:effectRef>
-          <a:fontRef idx="minor">
-            <a:schemeClr val="lt1"/>
-          </a:fontRef>
-        </p:style>
-        <p:txBody>
-          <a:bodyPr rtlCol="0" anchor="ctr"/>
-          <a:lstStyle/>
-          <a:p>
-            <a:pPr algn="ctr"/>
-            <a:endParaRPr lang="pt-BR"/>
-          </a:p>
-        </p:txBody>
-      </p:sp>
-      <p:sp>
-        <p:nvSpPr>
-          <p:cNvPr id="9" name="Retângulo 8"/>
-          <p:cNvSpPr/>
-          <p:nvPr/>
-        </p:nvSpPr>
-        <p:spPr>
-          <a:xfrm>
-            <a:off x="6761554" y="1404647"/>
-            <a:ext cx="5760000" cy="2880000"/>
-          </a:xfrm>
-          <a:prstGeom prst="rect">
-            <a:avLst/>
-          </a:prstGeom>
-          <a:noFill/>
-          <a:ln>
-            <a:solidFill>
-              <a:srgbClr val="253746"/>
-            </a:solidFill>
-          </a:ln>
-        </p:spPr>
-        <p:style>
-          <a:lnRef idx="2">
-            <a:schemeClr val="accent1">
-              <a:shade val="50000"/>
-            </a:schemeClr>
-          </a:lnRef>
-          <a:fillRef idx="1">
-            <a:schemeClr val="accent1"/>
-          </a:fillRef>
-          <a:effectRef idx="0">
-            <a:schemeClr val="accent1"/>
-          </a:effectRef>
-          <a:fontRef idx="minor">
-            <a:schemeClr val="lt1"/>
-          </a:fontRef>
-        </p:style>
-        <p:txBody>
-          <a:bodyPr rtlCol="0" anchor="ctr"/>
-          <a:lstStyle/>
-          <a:p>
-            <a:pPr algn="ctr"/>
-            <a:endParaRPr lang="pt-BR"/>
-          </a:p>
-        </p:txBody>
-      </p:sp>
-      <p:sp>
-        <p:nvSpPr>
-          <p:cNvPr id="10" name="Espaço Reservado para Texto 1"/>
-          <p:cNvSpPr>
+          <p:cNvPr id="3" name="object 3"/>
+          <p:cNvSpPr txBox="1">
             <a:spLocks noGrp="1"/>
           </p:cNvSpPr>
           <p:nvPr>
-            <p:ph type="body" sz="quarter" idx="11"/>
+            <p:ph type="title"/>
           </p:nvPr>
         </p:nvSpPr>
         <p:spPr>
           <a:xfrm>
-            <a:off x="2153042" y="756295"/>
-            <a:ext cx="12201281" cy="1440597"/>
-          </a:xfrm>
-        </p:spPr>
-        <p:txBody>
-          <a:bodyPr/>
-          <a:lstStyle/>
-          <a:p>
-            <a:pPr marL="0" indent="0">
-              <a:buNone/>
-            </a:pPr>
-            <a:r>
-              <a:rPr lang="pt-BR" sz="3200"/>
-              <a:t>Usuário frequente de serviço de diarista (1x semana)</a:t>
-            </a:r>
-            <a:endParaRPr lang="pt-BR" sz="3200"/>
-          </a:p>
-        </p:txBody>
-      </p:sp>
-      <p:sp>
-        <p:nvSpPr>
-          <p:cNvPr id="12" name="Retângulo 11"/>
-          <p:cNvSpPr/>
-          <p:nvPr/>
-        </p:nvSpPr>
-        <p:spPr>
-          <a:xfrm>
-            <a:off x="2813818" y="2268900"/>
-            <a:ext cx="3998794" cy="954107"/>
+            <a:off x="2262496" y="146813"/>
+            <a:ext cx="9221559" cy="590550"/>
           </a:xfrm>
           <a:prstGeom prst="rect">
             <a:avLst/>
           </a:prstGeom>
         </p:spPr>
         <p:txBody>
-          <a:bodyPr wrap="square">
+          <a:bodyPr vert="horz" wrap="square" lIns="0" tIns="14597" rIns="0" bIns="0" rtlCol="0" anchor="t">
             <a:spAutoFit/>
           </a:bodyPr>
           <a:lstStyle/>
           <a:p>
-            <a:r>
-              <a:rPr lang="pt-BR" sz="2000" dirty="0">
-                <a:latin typeface="Exo 2" pitchFamily="50" charset="0"/>
-              </a:rPr>
-              <a:t>Mary</a:t>
-            </a:r>
-            <a:endParaRPr lang="pt-BR" sz="2000" dirty="0">
-              <a:latin typeface="Exo 2" pitchFamily="50" charset="0"/>
-            </a:endParaRPr>
-          </a:p>
-          <a:p>
-            <a:r>
-              <a:rPr lang="pt-BR" sz="1800" dirty="0">
-                <a:latin typeface="Exo 2" pitchFamily="50" charset="0"/>
-              </a:rPr>
-              <a:t>“Sou nova na cidade e não consigo achar diarista confiável.”</a:t>
-            </a:r>
-            <a:endParaRPr lang="pt-BR" sz="1800" dirty="0">
-              <a:latin typeface="Exo 2" pitchFamily="50" charset="0"/>
-            </a:endParaRPr>
+            <a:pPr marL="12700">
+              <a:spcBef>
+                <a:spcPts val="115"/>
+              </a:spcBef>
+              <a:tabLst>
+                <a:tab pos="4100195" algn="l"/>
+              </a:tabLst>
+            </a:pPr>
+            <a:r>
+              <a:rPr lang="pt-BR" spc="15" noProof="1"/>
+              <a:t>Proto</a:t>
+            </a:r>
+            <a:r>
+              <a:rPr spc="15" dirty="0"/>
+              <a:t>-Persona</a:t>
+            </a:r>
+            <a:r>
+              <a:rPr lang="pt-BR" spc="-265" dirty="0"/>
+              <a:t> 2    </a:t>
+            </a:r>
+            <a:r>
+              <a:rPr lang="pt-BR" spc="-25" dirty="0"/>
+              <a:t>Usuário</a:t>
+            </a:r>
+            <a:r>
+              <a:rPr spc="-25" dirty="0"/>
+              <a:t>/</a:t>
+            </a:r>
+            <a:r>
+              <a:rPr spc="-555" dirty="0"/>
+              <a:t> </a:t>
+            </a:r>
+            <a:r>
+              <a:rPr spc="-15" dirty="0"/>
+              <a:t>Necessidades</a:t>
+            </a:r>
+            <a:endParaRPr lang="pt-BR" spc="-15"/>
           </a:p>
         </p:txBody>
       </p:sp>
       <p:sp>
         <p:nvSpPr>
-          <p:cNvPr id="13" name="Retângulo 12"/>
+          <p:cNvPr id="4" name="object 4"/>
           <p:cNvSpPr/>
           <p:nvPr/>
         </p:nvSpPr>
         <p:spPr>
           <a:xfrm>
-            <a:off x="6761554" y="2003797"/>
-            <a:ext cx="5760000" cy="1754326"/>
+            <a:off x="6759557" y="1406059"/>
+            <a:ext cx="5756731" cy="2877731"/>
+          </a:xfrm>
+          <a:custGeom>
+            <a:avLst/>
+            <a:gdLst/>
+            <a:ahLst/>
+            <a:cxnLst/>
+            <a:rect l="l" t="t" r="r" b="b"/>
+            <a:pathLst>
+              <a:path w="5759450" h="2879090">
+                <a:moveTo>
+                  <a:pt x="0" y="2878836"/>
+                </a:moveTo>
+                <a:lnTo>
+                  <a:pt x="5759196" y="2878836"/>
+                </a:lnTo>
+                <a:lnTo>
+                  <a:pt x="5759196" y="0"/>
+                </a:lnTo>
+                <a:lnTo>
+                  <a:pt x="0" y="0"/>
+                </a:lnTo>
+                <a:lnTo>
+                  <a:pt x="0" y="2878836"/>
+                </a:lnTo>
+                <a:close/>
+              </a:path>
+            </a:pathLst>
+          </a:custGeom>
+          <a:ln w="25400">
+            <a:solidFill>
+              <a:srgbClr val="243746"/>
+            </a:solidFill>
+          </a:ln>
+        </p:spPr>
+        <p:txBody>
+          <a:bodyPr wrap="square" lIns="0" tIns="0" rIns="0" bIns="0" rtlCol="0"/>
+          <a:lstStyle/>
+          <a:p/>
+        </p:txBody>
+      </p:sp>
+      <p:sp>
+        <p:nvSpPr>
+          <p:cNvPr id="5" name="object 5"/>
+          <p:cNvSpPr txBox="1"/>
+          <p:nvPr/>
+        </p:nvSpPr>
+        <p:spPr>
+          <a:xfrm>
+            <a:off x="3076875" y="788495"/>
+            <a:ext cx="9508444" cy="504190"/>
           </a:xfrm>
           <a:prstGeom prst="rect">
             <a:avLst/>
           </a:prstGeom>
         </p:spPr>
         <p:txBody>
-          <a:bodyPr wrap="square">
+          <a:bodyPr vert="horz" wrap="square" lIns="0" tIns="12694" rIns="0" bIns="0" rtlCol="0" anchor="t">
             <a:spAutoFit/>
           </a:bodyPr>
           <a:lstStyle/>
           <a:p>
-            <a:pPr marL="342900" indent="-342900">
-              <a:buFont typeface="Arial" panose="020B0604020202020204" pitchFamily="34" charset="0"/>
-              <a:buChar char="•"/>
+            <a:pPr marL="12700">
+              <a:spcBef>
+                <a:spcPts val="100"/>
+              </a:spcBef>
             </a:pPr>
             <a:r>
-              <a:rPr lang="pt-BR" sz="1800" dirty="0">
-                <a:latin typeface="Exo 2" pitchFamily="50" charset="0"/>
+              <a:rPr lang="pt-BR" sz="3200" spc="15" dirty="0">
+                <a:latin typeface="Arial" panose="020B0604020202020204"/>
+                <a:cs typeface="Arial" panose="020B0604020202020204"/>
               </a:rPr>
-              <a:t>Conectada (mas não </a:t>
-            </a:r>
-            <a:r>
-              <a:rPr lang="pt-BR" sz="1800" dirty="0" err="1">
-                <a:latin typeface="Exo 2" pitchFamily="50" charset="0"/>
+              <a:t>Usuário</a:t>
+            </a:r>
+            <a:r>
+              <a:rPr lang="pt-BR" sz="3200" spc="-210" dirty="0">
+                <a:latin typeface="Arial" panose="020B0604020202020204"/>
+                <a:cs typeface="Arial" panose="020B0604020202020204"/>
               </a:rPr>
-              <a:t>early-adopter</a:t>
-            </a:r>
-            <a:r>
-              <a:rPr lang="pt-BR" sz="1800" dirty="0">
-                <a:latin typeface="Exo 2" pitchFamily="50" charset="0"/>
+              <a:t> presta </a:t>
+            </a:r>
+            <a:r>
+              <a:rPr sz="3200" spc="20" dirty="0">
+                <a:latin typeface="Arial" panose="020B0604020202020204"/>
+                <a:cs typeface="Arial" panose="020B0604020202020204"/>
               </a:rPr>
-              <a:t>)</a:t>
-            </a:r>
-            <a:endParaRPr lang="pt-BR" sz="1800" dirty="0">
-              <a:latin typeface="Exo 2" pitchFamily="50" charset="0"/>
-            </a:endParaRPr>
-          </a:p>
-          <a:p>
-            <a:pPr marL="342900" indent="-342900">
-              <a:buFont typeface="Arial" panose="020B0604020202020204" pitchFamily="34" charset="0"/>
-              <a:buChar char="•"/>
-            </a:pPr>
-            <a:r>
-              <a:rPr lang="pt-BR" sz="1800" dirty="0">
-                <a:latin typeface="Exo 2" pitchFamily="50" charset="0"/>
+              <a:t>serviço</a:t>
+            </a:r>
+            <a:r>
+              <a:rPr sz="3200" spc="-200" dirty="0">
+                <a:latin typeface="Arial" panose="020B0604020202020204"/>
+                <a:cs typeface="Arial" panose="020B0604020202020204"/>
               </a:rPr>
-              <a:t>Atarefada</a:t>
-            </a:r>
-            <a:endParaRPr lang="pt-BR" sz="1800" dirty="0">
-              <a:latin typeface="Exo 2" pitchFamily="50" charset="0"/>
-            </a:endParaRPr>
-          </a:p>
-          <a:p>
-            <a:pPr marL="342900" indent="-342900">
-              <a:buFont typeface="Arial" panose="020B0604020202020204" pitchFamily="34" charset="0"/>
-              <a:buChar char="•"/>
-            </a:pPr>
-            <a:r>
-              <a:rPr lang="pt-BR" sz="1800" dirty="0">
-                <a:latin typeface="Exo 2" pitchFamily="50" charset="0"/>
+              <a:t> </a:t>
+            </a:r>
+            <a:r>
+              <a:rPr sz="3200" spc="10" dirty="0">
+                <a:latin typeface="Arial" panose="020B0604020202020204"/>
+                <a:cs typeface="Arial" panose="020B0604020202020204"/>
               </a:rPr>
-              <a:t>Solicita serviços como Comida via App</a:t>
-            </a:r>
-            <a:endParaRPr lang="pt-BR" sz="1800" dirty="0">
-              <a:latin typeface="Exo 2" pitchFamily="50" charset="0"/>
-            </a:endParaRPr>
-          </a:p>
-          <a:p>
-            <a:pPr marL="342900" indent="-342900">
-              <a:buFont typeface="Arial" panose="020B0604020202020204" pitchFamily="34" charset="0"/>
-              <a:buChar char="•"/>
-            </a:pPr>
-            <a:r>
-              <a:rPr lang="pt-BR" sz="1800" dirty="0">
-                <a:latin typeface="Exo 2" pitchFamily="50" charset="0"/>
+              <a:t>de</a:t>
+            </a:r>
+            <a:r>
+              <a:rPr sz="3200" spc="-220" dirty="0">
+                <a:latin typeface="Arial" panose="020B0604020202020204"/>
+                <a:cs typeface="Arial" panose="020B0604020202020204"/>
               </a:rPr>
-              <a:t>Gosta de utilizar Redes Sociais</a:t>
-            </a:r>
-            <a:endParaRPr lang="pt-BR" sz="1800" dirty="0">
-              <a:latin typeface="Exo 2" pitchFamily="50" charset="0"/>
-            </a:endParaRPr>
-          </a:p>
-          <a:p>
-            <a:pPr marL="342900" indent="-342900">
-              <a:buFont typeface="Arial" panose="020B0604020202020204" pitchFamily="34" charset="0"/>
-              <a:buChar char="•"/>
-            </a:pPr>
-            <a:r>
-              <a:rPr lang="pt-BR" sz="1800" dirty="0">
-                <a:latin typeface="Exo 2" pitchFamily="50" charset="0"/>
+              <a:t> </a:t>
+            </a:r>
+            <a:r>
+              <a:rPr sz="3200" spc="50" dirty="0">
+                <a:latin typeface="Arial" panose="020B0604020202020204"/>
+                <a:cs typeface="Arial" panose="020B0604020202020204"/>
               </a:rPr>
-              <a:t>Mora longe do Centro</a:t>
-            </a:r>
-            <a:endParaRPr lang="pt-BR" sz="1800" dirty="0">
-              <a:latin typeface="Exo 2" pitchFamily="50" charset="0"/>
-            </a:endParaRPr>
-          </a:p>
-          <a:p>
-            <a:pPr marL="342900" indent="-342900">
-              <a:buFont typeface="Arial" panose="020B0604020202020204" pitchFamily="34" charset="0"/>
-              <a:buChar char="•"/>
-            </a:pPr>
-            <a:r>
-              <a:rPr lang="pt-BR" sz="1800" dirty="0">
-                <a:latin typeface="Exo 2" pitchFamily="50" charset="0"/>
+              <a:t>diarista</a:t>
+            </a:r>
+            <a:r>
+              <a:rPr lang="pt-BR" sz="3200" spc="-204" dirty="0">
+                <a:latin typeface="Arial" panose="020B0604020202020204"/>
+                <a:cs typeface="Arial" panose="020B0604020202020204"/>
               </a:rPr>
-              <a:t>É impaciente</a:t>
-            </a:r>
-            <a:endParaRPr lang="pt-BR" sz="1800" dirty="0">
-              <a:latin typeface="Exo 2" pitchFamily="50" charset="0"/>
+              <a:t> </a:t>
+            </a:r>
+            <a:endParaRPr lang="pt-BR" sz="3200" spc="-15">
+              <a:latin typeface="Arial" panose="020B0604020202020204"/>
+              <a:cs typeface="Arial" panose="020B0604020202020204"/>
             </a:endParaRPr>
           </a:p>
         </p:txBody>
       </p:sp>
       <p:sp>
         <p:nvSpPr>
-          <p:cNvPr id="16" name="Retângulo 15"/>
-          <p:cNvSpPr/>
+          <p:cNvPr id="10" name="object 10"/>
+          <p:cNvSpPr txBox="1"/>
           <p:nvPr/>
         </p:nvSpPr>
         <p:spPr>
           <a:xfrm>
-            <a:off x="857538" y="6507884"/>
-            <a:ext cx="4329519" cy="307777"/>
+            <a:off x="6983095" y="1869440"/>
+            <a:ext cx="4308475" cy="2165985"/>
           </a:xfrm>
           <a:prstGeom prst="rect">
             <a:avLst/>
           </a:prstGeom>
         </p:spPr>
         <p:txBody>
-          <a:bodyPr wrap="none">
+          <a:bodyPr vert="horz" wrap="square" lIns="0" tIns="12694" rIns="0" bIns="0" rtlCol="0" anchor="t">
             <a:spAutoFit/>
           </a:bodyPr>
           <a:lstStyle/>
           <a:p>
-            <a:r>
-              <a:rPr lang="pt-BR" sz="1400" dirty="0"/>
-              <a:t>Modelo baseado em </a:t>
-            </a:r>
-            <a:r>
-              <a:rPr lang="pt-BR" sz="1400" dirty="0" err="1"/>
-              <a:t>Lean</a:t>
-            </a:r>
-            <a:r>
-              <a:rPr lang="pt-BR" sz="1400" dirty="0"/>
-              <a:t> UX. Não é amostra estatística. </a:t>
-            </a:r>
-            <a:endParaRPr lang="pt-BR" sz="1400" dirty="0"/>
+            <a:pPr marL="341630" indent="-342265">
+              <a:spcBef>
+                <a:spcPts val="100"/>
+              </a:spcBef>
+              <a:buFont typeface="Arial" panose="020B0604020202020204"/>
+              <a:buChar char="•"/>
+              <a:tabLst>
+                <a:tab pos="341630" algn="l"/>
+                <a:tab pos="342265" algn="l"/>
+              </a:tabLst>
+            </a:pPr>
+            <a:r>
+              <a:rPr lang="pt-BR" sz="2000" spc="30" dirty="0">
+                <a:latin typeface="Arial" panose="020B0604020202020204" pitchFamily="34" charset="0"/>
+                <a:cs typeface="Arial" panose="020B0604020202020204" pitchFamily="34" charset="0"/>
+              </a:rPr>
+              <a:t>Não utiliza a internet </a:t>
+            </a:r>
+            <a:r>
+              <a:rPr lang="pt-BR" sz="2000" spc="30" dirty="0">
+                <a:latin typeface="Arial" panose="020B0604020202020204" pitchFamily="34" charset="0"/>
+                <a:ea typeface="+mn-lt"/>
+                <a:cs typeface="Arial" panose="020B0604020202020204" pitchFamily="34" charset="0"/>
+              </a:rPr>
+              <a:t>frequentemente</a:t>
+            </a:r>
+            <a:endParaRPr lang="pt-BR" sz="2000" spc="30" dirty="0">
+              <a:latin typeface="Arial" panose="020B0604020202020204" pitchFamily="34" charset="0"/>
+              <a:cs typeface="Arial" panose="020B0604020202020204" pitchFamily="34" charset="0"/>
+            </a:endParaRPr>
+          </a:p>
+          <a:p>
+            <a:pPr marL="342265" indent="-342900">
+              <a:buChar char="•"/>
+              <a:tabLst>
+                <a:tab pos="342265" algn="l"/>
+                <a:tab pos="342900" algn="l"/>
+              </a:tabLst>
+            </a:pPr>
+            <a:r>
+              <a:rPr lang="pt-BR" sz="2000" spc="10" dirty="0">
+                <a:latin typeface="Arial" panose="020B0604020202020204" pitchFamily="34" charset="0"/>
+                <a:cs typeface="Arial" panose="020B0604020202020204" pitchFamily="34" charset="0"/>
+              </a:rPr>
+              <a:t>Procura melhores condições </a:t>
+            </a:r>
+            <a:endParaRPr lang="pt-BR" sz="2000" spc="10" dirty="0">
+              <a:latin typeface="Arial" panose="020B0604020202020204" pitchFamily="34" charset="0"/>
+              <a:cs typeface="Arial" panose="020B0604020202020204" pitchFamily="34" charset="0"/>
+            </a:endParaRPr>
+          </a:p>
+          <a:p>
+            <a:pPr marL="341630" indent="-342265">
+              <a:buFont typeface="Arial" panose="020B0604020202020204"/>
+              <a:buChar char="•"/>
+              <a:tabLst>
+                <a:tab pos="341630" algn="l"/>
+                <a:tab pos="342265" algn="l"/>
+              </a:tabLst>
+            </a:pPr>
+            <a:r>
+              <a:rPr lang="pt-BR" sz="2000" spc="10" dirty="0">
+                <a:latin typeface="Arial" panose="020B0604020202020204" pitchFamily="34" charset="0"/>
+                <a:cs typeface="Arial" panose="020B0604020202020204" pitchFamily="34" charset="0"/>
+              </a:rPr>
+              <a:t>Autônoma</a:t>
+            </a:r>
+            <a:endParaRPr sz="2000" dirty="0">
+              <a:latin typeface="Arial" panose="020B0604020202020204" pitchFamily="34" charset="0"/>
+              <a:cs typeface="Arial" panose="020B0604020202020204" pitchFamily="34" charset="0"/>
+            </a:endParaRPr>
+          </a:p>
+          <a:p>
+            <a:pPr marL="341630" indent="-342265">
+              <a:buFont typeface="Arial" panose="020B0604020202020204"/>
+              <a:buChar char="•"/>
+              <a:tabLst>
+                <a:tab pos="341630" algn="l"/>
+                <a:tab pos="342265" algn="l"/>
+              </a:tabLst>
+            </a:pPr>
+            <a:r>
+              <a:rPr lang="pt-BR" sz="2000" spc="-10" dirty="0">
+                <a:latin typeface="Arial" panose="020B0604020202020204" pitchFamily="34" charset="0"/>
+                <a:cs typeface="Arial" panose="020B0604020202020204" pitchFamily="34" charset="0"/>
+              </a:rPr>
+              <a:t>Tem filhos</a:t>
+            </a:r>
+            <a:endParaRPr sz="2000" dirty="0">
+              <a:latin typeface="Arial" panose="020B0604020202020204" pitchFamily="34" charset="0"/>
+              <a:cs typeface="Arial" panose="020B0604020202020204" pitchFamily="34" charset="0"/>
+            </a:endParaRPr>
+          </a:p>
+          <a:p>
+            <a:pPr marL="342900" indent="-343535">
+              <a:buFont typeface="Arial" panose="020B0604020202020204"/>
+              <a:buChar char="•"/>
+              <a:tabLst>
+                <a:tab pos="342900" algn="l"/>
+                <a:tab pos="343535" algn="l"/>
+              </a:tabLst>
+            </a:pPr>
+            <a:r>
+              <a:rPr lang="pt-BR" sz="2000" spc="25" dirty="0">
+                <a:latin typeface="Arial" panose="020B0604020202020204" pitchFamily="34" charset="0"/>
+                <a:cs typeface="Arial" panose="020B0604020202020204" pitchFamily="34" charset="0"/>
+              </a:rPr>
+              <a:t>Paciente </a:t>
+            </a:r>
+            <a:endParaRPr lang="pt-BR" sz="2000" spc="25" dirty="0">
+              <a:latin typeface="Arial" panose="020B0604020202020204" pitchFamily="34" charset="0"/>
+              <a:cs typeface="Arial" panose="020B0604020202020204" pitchFamily="34" charset="0"/>
+            </a:endParaRPr>
+          </a:p>
+          <a:p>
+            <a:pPr marL="342900" indent="-343535">
+              <a:buFont typeface="Arial" panose="020B0604020202020204"/>
+              <a:buChar char="•"/>
+              <a:tabLst>
+                <a:tab pos="342900" algn="l"/>
+                <a:tab pos="343535" algn="l"/>
+              </a:tabLst>
+            </a:pPr>
+            <a:r>
+              <a:rPr lang="pt-PT" sz="2000" dirty="0">
+                <a:latin typeface="Arial" panose="020B0604020202020204" pitchFamily="34" charset="0"/>
+                <a:cs typeface="Arial" panose="020B0604020202020204" pitchFamily="34" charset="0"/>
+              </a:rPr>
+              <a:t>Mora em região periférica</a:t>
+            </a:r>
+            <a:endParaRPr lang="pt-PT" sz="2000" dirty="0">
+              <a:latin typeface="Arial" panose="020B0604020202020204" pitchFamily="34" charset="0"/>
+              <a:cs typeface="Arial" panose="020B0604020202020204" pitchFamily="34" charset="0"/>
+            </a:endParaRPr>
           </a:p>
         </p:txBody>
       </p:sp>
       <p:sp>
         <p:nvSpPr>
-          <p:cNvPr id="17" name="Retângulo 16"/>
-          <p:cNvSpPr/>
+          <p:cNvPr id="12" name="object 12"/>
+          <p:cNvSpPr txBox="1"/>
           <p:nvPr/>
         </p:nvSpPr>
         <p:spPr>
           <a:xfrm>
-            <a:off x="928906" y="1513292"/>
-            <a:ext cx="5864577" cy="338554"/>
+            <a:off x="6983015" y="1612209"/>
+            <a:ext cx="3762502" cy="257175"/>
           </a:xfrm>
           <a:prstGeom prst="rect">
             <a:avLst/>
           </a:prstGeom>
         </p:spPr>
         <p:txBody>
-          <a:bodyPr wrap="square">
+          <a:bodyPr vert="horz" wrap="square" lIns="0" tIns="12059" rIns="0" bIns="0" rtlCol="0">
             <a:spAutoFit/>
           </a:bodyPr>
           <a:lstStyle/>
           <a:p>
-            <a:r>
-              <a:rPr lang="pt-BR" sz="1600" b="1" dirty="0">
+            <a:pPr>
+              <a:lnSpc>
+                <a:spcPct val="100000"/>
+              </a:lnSpc>
+              <a:spcBef>
+                <a:spcPts val="95"/>
+              </a:spcBef>
+            </a:pPr>
+            <a:r>
+              <a:rPr sz="1600" b="1" spc="-5" dirty="0">
                 <a:solidFill>
                   <a:srgbClr val="E6005A"/>
                 </a:solidFill>
-                <a:latin typeface="Exo 2" pitchFamily="50" charset="0"/>
+                <a:latin typeface="Arial" panose="020B0604020202020204"/>
+                <a:cs typeface="Arial" panose="020B0604020202020204"/>
               </a:rPr>
-              <a:t>Quem? Nome, foto e uma frase que especifique o problema</a:t>
-            </a:r>
-            <a:endParaRPr lang="pt-BR" sz="1600" b="1" dirty="0">
-              <a:solidFill>
-                <a:srgbClr val="E6005A"/>
-              </a:solidFill>
-              <a:latin typeface="Exo 2" pitchFamily="50" charset="0"/>
+              <a:t>Palavras/</a:t>
+            </a:r>
+            <a:r>
+              <a:rPr sz="1600" b="1" spc="-265" dirty="0">
+                <a:solidFill>
+                  <a:srgbClr val="E6005A"/>
+                </a:solidFill>
+                <a:latin typeface="Arial" panose="020B0604020202020204"/>
+                <a:cs typeface="Arial" panose="020B0604020202020204"/>
+              </a:rPr>
+              <a:t> </a:t>
+            </a:r>
+            <a:r>
+              <a:rPr sz="1600" b="1" spc="5" dirty="0">
+                <a:solidFill>
+                  <a:srgbClr val="E6005A"/>
+                </a:solidFill>
+                <a:latin typeface="Arial" panose="020B0604020202020204"/>
+                <a:cs typeface="Arial" panose="020B0604020202020204"/>
+              </a:rPr>
+              <a:t>frases</a:t>
+            </a:r>
+            <a:r>
+              <a:rPr sz="1600" b="1" spc="-80" dirty="0">
+                <a:solidFill>
+                  <a:srgbClr val="E6005A"/>
+                </a:solidFill>
+                <a:latin typeface="Arial" panose="020B0604020202020204"/>
+                <a:cs typeface="Arial" panose="020B0604020202020204"/>
+              </a:rPr>
+              <a:t> </a:t>
+            </a:r>
+            <a:r>
+              <a:rPr sz="1600" b="1" spc="-15" dirty="0">
+                <a:solidFill>
+                  <a:srgbClr val="E6005A"/>
+                </a:solidFill>
+                <a:latin typeface="Arial" panose="020B0604020202020204"/>
+                <a:cs typeface="Arial" panose="020B0604020202020204"/>
+              </a:rPr>
+              <a:t>que</a:t>
+            </a:r>
+            <a:r>
+              <a:rPr sz="1600" b="1" spc="-65" dirty="0">
+                <a:solidFill>
+                  <a:srgbClr val="E6005A"/>
+                </a:solidFill>
+                <a:latin typeface="Arial" panose="020B0604020202020204"/>
+                <a:cs typeface="Arial" panose="020B0604020202020204"/>
+              </a:rPr>
+              <a:t> </a:t>
+            </a:r>
+            <a:r>
+              <a:rPr sz="1600" b="1" dirty="0">
+                <a:solidFill>
+                  <a:srgbClr val="E6005A"/>
+                </a:solidFill>
+                <a:latin typeface="Arial" panose="020B0604020202020204"/>
+                <a:cs typeface="Arial" panose="020B0604020202020204"/>
+              </a:rPr>
+              <a:t>definem</a:t>
+            </a:r>
+            <a:r>
+              <a:rPr sz="1600" b="1" spc="-70" dirty="0">
+                <a:solidFill>
+                  <a:srgbClr val="E6005A"/>
+                </a:solidFill>
+                <a:latin typeface="Arial" panose="020B0604020202020204"/>
+                <a:cs typeface="Arial" panose="020B0604020202020204"/>
+              </a:rPr>
+              <a:t> </a:t>
+            </a:r>
+            <a:r>
+              <a:rPr sz="1600" b="1" spc="-5" dirty="0">
+                <a:solidFill>
+                  <a:srgbClr val="E6005A"/>
+                </a:solidFill>
+                <a:latin typeface="Arial" panose="020B0604020202020204"/>
+                <a:cs typeface="Arial" panose="020B0604020202020204"/>
+              </a:rPr>
+              <a:t>a</a:t>
+            </a:r>
+            <a:r>
+              <a:rPr sz="1600" b="1" spc="-85" dirty="0">
+                <a:solidFill>
+                  <a:srgbClr val="E6005A"/>
+                </a:solidFill>
+                <a:latin typeface="Arial" panose="020B0604020202020204"/>
+                <a:cs typeface="Arial" panose="020B0604020202020204"/>
+              </a:rPr>
+              <a:t> </a:t>
+            </a:r>
+            <a:r>
+              <a:rPr sz="1600" b="1" spc="-10" dirty="0">
+                <a:solidFill>
+                  <a:srgbClr val="E6005A"/>
+                </a:solidFill>
+                <a:latin typeface="Arial" panose="020B0604020202020204"/>
+                <a:cs typeface="Arial" panose="020B0604020202020204"/>
+              </a:rPr>
+              <a:t>persona</a:t>
+            </a:r>
+            <a:endParaRPr sz="1600">
+              <a:latin typeface="Arial" panose="020B0604020202020204"/>
+              <a:cs typeface="Arial" panose="020B0604020202020204"/>
             </a:endParaRPr>
           </a:p>
         </p:txBody>
       </p:sp>
       <p:sp>
         <p:nvSpPr>
-          <p:cNvPr id="18" name="Retângulo 17"/>
-          <p:cNvSpPr/>
+          <p:cNvPr id="13" name="object 13"/>
+          <p:cNvSpPr txBox="1"/>
           <p:nvPr/>
         </p:nvSpPr>
         <p:spPr>
           <a:xfrm>
-            <a:off x="6894605" y="1575817"/>
-            <a:ext cx="4097446" cy="338554"/>
+            <a:off x="935678" y="4283628"/>
+            <a:ext cx="11586452" cy="1373505"/>
+          </a:xfrm>
+          <a:prstGeom prst="rect">
+            <a:avLst/>
+          </a:prstGeom>
+          <a:ln w="25400">
+            <a:solidFill>
+              <a:srgbClr val="243746"/>
+            </a:solidFill>
+          </a:ln>
+        </p:spPr>
+        <p:txBody>
+          <a:bodyPr vert="horz" wrap="square" lIns="0" tIns="48237" rIns="0" bIns="0" rtlCol="0" anchor="t">
+            <a:spAutoFit/>
+          </a:bodyPr>
+          <a:lstStyle/>
+          <a:p>
+            <a:pPr marL="182245">
+              <a:lnSpc>
+                <a:spcPct val="100000"/>
+              </a:lnSpc>
+              <a:spcBef>
+                <a:spcPts val="380"/>
+              </a:spcBef>
+            </a:pPr>
+            <a:r>
+              <a:rPr sz="1600" b="1" spc="-15" dirty="0">
+                <a:solidFill>
+                  <a:srgbClr val="E6005A"/>
+                </a:solidFill>
+                <a:latin typeface="Arial" panose="020B0604020202020204"/>
+                <a:cs typeface="Arial" panose="020B0604020202020204"/>
+              </a:rPr>
+              <a:t>Dores </a:t>
+            </a:r>
+            <a:r>
+              <a:rPr sz="1600" b="1" spc="-5" dirty="0">
+                <a:solidFill>
+                  <a:srgbClr val="E6005A"/>
+                </a:solidFill>
+                <a:latin typeface="Arial" panose="020B0604020202020204"/>
+                <a:cs typeface="Arial" panose="020B0604020202020204"/>
+              </a:rPr>
+              <a:t>e</a:t>
+            </a:r>
+            <a:r>
+              <a:rPr sz="1600" b="1" spc="-200" dirty="0">
+                <a:solidFill>
+                  <a:srgbClr val="E6005A"/>
+                </a:solidFill>
+                <a:latin typeface="Arial" panose="020B0604020202020204"/>
+                <a:cs typeface="Arial" panose="020B0604020202020204"/>
+              </a:rPr>
+              <a:t> </a:t>
+            </a:r>
+            <a:r>
+              <a:rPr sz="1600" b="1" spc="-20" dirty="0">
+                <a:solidFill>
+                  <a:srgbClr val="E6005A"/>
+                </a:solidFill>
+                <a:latin typeface="Arial" panose="020B0604020202020204"/>
+                <a:cs typeface="Arial" panose="020B0604020202020204"/>
+              </a:rPr>
+              <a:t>Necessidades</a:t>
+            </a:r>
+            <a:endParaRPr sz="1600">
+              <a:latin typeface="Arial" panose="020B0604020202020204"/>
+              <a:cs typeface="Arial" panose="020B0604020202020204"/>
+            </a:endParaRPr>
+          </a:p>
+          <a:p>
+            <a:pPr marL="424180" indent="-343535">
+              <a:spcBef>
+                <a:spcPts val="860"/>
+              </a:spcBef>
+              <a:buChar char="•"/>
+              <a:tabLst>
+                <a:tab pos="423545" algn="l"/>
+                <a:tab pos="424815" algn="l"/>
+              </a:tabLst>
+            </a:pPr>
+            <a:r>
+              <a:rPr lang="pt-PT" altLang="pt-BR" spc="-15" dirty="0">
+                <a:latin typeface="Arial" panose="020B0604020202020204"/>
+                <a:cs typeface="Arial" panose="020B0604020202020204"/>
+              </a:rPr>
+              <a:t>Dificil achar clientes por conta própria</a:t>
+            </a:r>
+            <a:r>
+              <a:rPr lang="pt-BR" spc="-15" dirty="0">
+                <a:latin typeface="Arial" panose="020B0604020202020204"/>
+                <a:cs typeface="Arial" panose="020B0604020202020204"/>
+              </a:rPr>
+              <a:t>. </a:t>
+            </a:r>
+            <a:endParaRPr lang="pt-BR" sz="1800" spc="-15" dirty="0">
+              <a:latin typeface="Arial" panose="020B0604020202020204"/>
+              <a:cs typeface="Arial" panose="020B0604020202020204"/>
+            </a:endParaRPr>
+          </a:p>
+          <a:p>
+            <a:pPr marL="424180" indent="-343535">
+              <a:buFont typeface="Arial" panose="020B0604020202020204"/>
+              <a:buChar char="•"/>
+              <a:tabLst>
+                <a:tab pos="424180" algn="l"/>
+                <a:tab pos="424815" algn="l"/>
+              </a:tabLst>
+            </a:pPr>
+            <a:r>
+              <a:rPr lang="pt-PT" altLang="pt-BR" spc="-15" dirty="0">
+                <a:latin typeface="Arial" panose="020B0604020202020204"/>
+                <a:cs typeface="Arial" panose="020B0604020202020204"/>
+              </a:rPr>
+              <a:t>Clientes que respeitem ela</a:t>
+            </a:r>
+            <a:endParaRPr lang="pt-BR" sz="1800" spc="-15" dirty="0">
+              <a:latin typeface="Arial" panose="020B0604020202020204"/>
+              <a:cs typeface="Arial" panose="020B0604020202020204"/>
+            </a:endParaRPr>
+          </a:p>
+          <a:p>
+            <a:pPr marL="424180" indent="-343535">
+              <a:buFont typeface="Arial" panose="020B0604020202020204"/>
+              <a:buChar char="•"/>
+              <a:tabLst>
+                <a:tab pos="424180" algn="l"/>
+                <a:tab pos="424815" algn="l"/>
+              </a:tabLst>
+            </a:pPr>
+            <a:r>
+              <a:rPr lang="pt-BR" spc="-85" dirty="0">
+                <a:latin typeface="Arial" panose="020B0604020202020204"/>
+                <a:cs typeface="Arial" panose="020B0604020202020204"/>
+              </a:rPr>
+              <a:t>Segurança na hora do pagamento. </a:t>
+            </a:r>
+            <a:endParaRPr sz="1800" dirty="0">
+              <a:latin typeface="Arial" panose="020B0604020202020204"/>
+              <a:cs typeface="Arial" panose="020B0604020202020204"/>
+            </a:endParaRPr>
+          </a:p>
+        </p:txBody>
+      </p:sp>
+      <p:sp>
+        <p:nvSpPr>
+          <p:cNvPr id="14" name="object 14"/>
+          <p:cNvSpPr txBox="1"/>
+          <p:nvPr/>
+        </p:nvSpPr>
+        <p:spPr>
+          <a:xfrm>
+            <a:off x="13129362" y="7235602"/>
+            <a:ext cx="114881" cy="205105"/>
           </a:xfrm>
           <a:prstGeom prst="rect">
             <a:avLst/>
           </a:prstGeom>
         </p:spPr>
         <p:txBody>
-          <a:bodyPr wrap="square">
+          <a:bodyPr vert="horz" wrap="square" lIns="0" tIns="13963" rIns="0" bIns="0" rtlCol="0">
             <a:spAutoFit/>
           </a:bodyPr>
           <a:lstStyle/>
           <a:p>
-            <a:r>
-              <a:rPr lang="pt-BR" sz="1600" b="1" dirty="0">
+            <a:pPr marL="12700">
+              <a:lnSpc>
+                <a:spcPct val="100000"/>
+              </a:lnSpc>
+              <a:spcBef>
+                <a:spcPts val="110"/>
+              </a:spcBef>
+            </a:pPr>
+            <a:r>
+              <a:rPr sz="1250" b="1" spc="5" dirty="0">
                 <a:solidFill>
-                  <a:srgbClr val="E6005A"/>
+                  <a:srgbClr val="FFFFFF"/>
                 </a:solidFill>
-                <a:latin typeface="Exo 2" pitchFamily="50" charset="0"/>
+                <a:latin typeface="Arial" panose="020B0604020202020204"/>
+                <a:cs typeface="Arial" panose="020B0604020202020204"/>
               </a:rPr>
-              <a:t>Palavras/frases que definem a persona</a:t>
-            </a:r>
-            <a:endParaRPr lang="pt-BR" sz="1600" b="1" dirty="0">
-              <a:solidFill>
-                <a:srgbClr val="E6005A"/>
-              </a:solidFill>
-              <a:latin typeface="Exo 2" pitchFamily="50" charset="0"/>
+              <a:t>1</a:t>
+            </a:r>
+            <a:endParaRPr sz="1250">
+              <a:latin typeface="Arial" panose="020B0604020202020204"/>
+              <a:cs typeface="Arial" panose="020B0604020202020204"/>
             </a:endParaRPr>
           </a:p>
         </p:txBody>
       </p:sp>
       <p:sp>
         <p:nvSpPr>
-          <p:cNvPr id="19" name="Retângulo 18"/>
+          <p:cNvPr id="16" name="object 4"/>
           <p:cNvSpPr/>
           <p:nvPr/>
         </p:nvSpPr>
         <p:spPr>
           <a:xfrm>
-            <a:off x="1021878" y="4356695"/>
-            <a:ext cx="2819277" cy="338554"/>
+            <a:off x="929033" y="1406058"/>
+            <a:ext cx="5756731" cy="2877731"/>
+          </a:xfrm>
+          <a:custGeom>
+            <a:avLst/>
+            <a:gdLst/>
+            <a:ahLst/>
+            <a:cxnLst/>
+            <a:rect l="l" t="t" r="r" b="b"/>
+            <a:pathLst>
+              <a:path w="5759450" h="2879090">
+                <a:moveTo>
+                  <a:pt x="0" y="2878836"/>
+                </a:moveTo>
+                <a:lnTo>
+                  <a:pt x="5759196" y="2878836"/>
+                </a:lnTo>
+                <a:lnTo>
+                  <a:pt x="5759196" y="0"/>
+                </a:lnTo>
+                <a:lnTo>
+                  <a:pt x="0" y="0"/>
+                </a:lnTo>
+                <a:lnTo>
+                  <a:pt x="0" y="2878836"/>
+                </a:lnTo>
+                <a:close/>
+              </a:path>
+            </a:pathLst>
+          </a:custGeom>
+          <a:ln w="25400">
+            <a:solidFill>
+              <a:srgbClr val="243746"/>
+            </a:solidFill>
+          </a:ln>
+        </p:spPr>
+        <p:txBody>
+          <a:bodyPr wrap="square" lIns="0" tIns="0" rIns="0" bIns="0" rtlCol="0"/>
+          <a:lstStyle/>
+          <a:p/>
+        </p:txBody>
+      </p:sp>
+      <p:sp>
+        <p:nvSpPr>
+          <p:cNvPr id="19" name="object 12"/>
+          <p:cNvSpPr txBox="1"/>
+          <p:nvPr/>
+        </p:nvSpPr>
+        <p:spPr>
+          <a:xfrm>
+            <a:off x="1099518" y="1517057"/>
+            <a:ext cx="5581688" cy="503555"/>
           </a:xfrm>
           <a:prstGeom prst="rect">
             <a:avLst/>
           </a:prstGeom>
         </p:spPr>
         <p:txBody>
-          <a:bodyPr wrap="square">
+          <a:bodyPr vert="horz" wrap="square" lIns="0" tIns="12059" rIns="0" bIns="0" rtlCol="0" anchor="t">
             <a:spAutoFit/>
           </a:bodyPr>
           <a:lstStyle/>
           <a:p>
-            <a:r>
-              <a:rPr lang="pt-BR" sz="1600" b="1">
+            <a:pPr>
+              <a:spcBef>
+                <a:spcPts val="95"/>
+              </a:spcBef>
+            </a:pPr>
+            <a:r>
+              <a:rPr lang="pt-BR" sz="1600" b="1" spc="-5" dirty="0">
                 <a:solidFill>
                   <a:srgbClr val="E6005A"/>
                 </a:solidFill>
-                <a:latin typeface="Exo 2" pitchFamily="50" charset="0"/>
+                <a:latin typeface="Arial" panose="020B0604020202020204"/>
+                <a:cs typeface="Arial" panose="020B0604020202020204"/>
               </a:rPr>
-              <a:t>Dores e Necessidades</a:t>
-            </a:r>
-            <a:endParaRPr lang="pt-BR" sz="1600" b="1">
+              <a:t>Quem ? Nome, foto e uma frase que especifica o problema</a:t>
+            </a:r>
+            <a:endParaRPr lang="pt-BR" sz="1600" b="1" spc="-5" dirty="0">
               <a:solidFill>
                 <a:srgbClr val="E6005A"/>
               </a:solidFill>
-              <a:latin typeface="Exo 2" pitchFamily="50" charset="0"/>
+              <a:latin typeface="Arial" panose="020B0604020202020204"/>
+              <a:cs typeface="Arial" panose="020B0604020202020204"/>
             </a:endParaRPr>
           </a:p>
         </p:txBody>
       </p:sp>
       <p:sp>
         <p:nvSpPr>
-          <p:cNvPr id="14" name="Retângulo 13"/>
-          <p:cNvSpPr/>
+          <p:cNvPr id="21" name="object 10"/>
+          <p:cNvSpPr txBox="1"/>
           <p:nvPr/>
         </p:nvSpPr>
         <p:spPr>
           <a:xfrm>
-            <a:off x="920757" y="4712667"/>
-            <a:ext cx="10430866" cy="1754326"/>
+            <a:off x="4024293" y="2126090"/>
+            <a:ext cx="2502898" cy="1653540"/>
           </a:xfrm>
           <a:prstGeom prst="rect">
             <a:avLst/>
           </a:prstGeom>
         </p:spPr>
         <p:txBody>
-          <a:bodyPr wrap="square">
+          <a:bodyPr vert="horz" wrap="square" lIns="0" tIns="12694" rIns="0" bIns="0" rtlCol="0" anchor="t">
             <a:spAutoFit/>
           </a:bodyPr>
           <a:lstStyle/>
           <a:p>
-            <a:pPr marL="342900" indent="-342900">
-              <a:buFont typeface="Arial" panose="020B0604020202020204" pitchFamily="34" charset="0"/>
-              <a:buChar char="•"/>
+            <a:pPr>
+              <a:spcBef>
+                <a:spcPts val="100"/>
+              </a:spcBef>
+              <a:tabLst>
+                <a:tab pos="341630" algn="l"/>
+                <a:tab pos="342265" algn="l"/>
+              </a:tabLst>
             </a:pPr>
             <a:r>
-              <a:rPr lang="pt-BR" sz="1800" dirty="0">
-                <a:latin typeface="Exo 2" pitchFamily="50" charset="0"/>
+              <a:rPr lang="pt-BR" spc="-10" dirty="0">
+                <a:latin typeface="Arial" panose="020B0604020202020204"/>
+                <a:cs typeface="Arial" panose="020B0604020202020204"/>
               </a:rPr>
-              <a:t>Precisa de apoio para limpeza de apartamento (1x por semana)</a:t>
-            </a:r>
-            <a:endParaRPr lang="pt-BR" sz="1800" dirty="0">
-              <a:latin typeface="Exo 2" pitchFamily="50" charset="0"/>
+              <a:t>Maria</a:t>
+            </a:r>
+            <a:endParaRPr lang="pt-BR" spc="-10" dirty="0">
+              <a:latin typeface="Arial" panose="020B0604020202020204"/>
+              <a:cs typeface="Arial" panose="020B0604020202020204"/>
             </a:endParaRPr>
           </a:p>
           <a:p>
-            <a:pPr marL="342900" indent="-342900">
-              <a:buFont typeface="Arial" panose="020B0604020202020204" pitchFamily="34" charset="0"/>
-              <a:buChar char="•"/>
+            <a:pPr>
+              <a:spcBef>
+                <a:spcPts val="100"/>
+              </a:spcBef>
+              <a:tabLst>
+                <a:tab pos="341630" algn="l"/>
+                <a:tab pos="342265" algn="l"/>
+              </a:tabLst>
             </a:pPr>
-            <a:r>
-              <a:rPr lang="pt-BR" sz="1800" dirty="0">
-                <a:latin typeface="Exo 2" pitchFamily="50" charset="0"/>
+            <a:endParaRPr lang="pt-BR" spc="-10" dirty="0">
+              <a:latin typeface="Arial" panose="020B0604020202020204"/>
+              <a:cs typeface="Arial" panose="020B0604020202020204"/>
+            </a:endParaRPr>
+          </a:p>
+          <a:p>
+            <a:pPr>
+              <a:spcBef>
+                <a:spcPts val="100"/>
+              </a:spcBef>
+              <a:tabLst>
+                <a:tab pos="341630" algn="l"/>
+                <a:tab pos="342265" algn="l"/>
+              </a:tabLst>
+            </a:pPr>
+            <a:r>
+              <a:rPr lang="pt-BR" spc="-10" dirty="0">
+                <a:latin typeface="Arial" panose="020B0604020202020204"/>
+                <a:cs typeface="Arial" panose="020B0604020202020204"/>
               </a:rPr>
-              <a:t>As diaristas atrasam, faltam, sem explicações</a:t>
-            </a:r>
-            <a:endParaRPr lang="pt-BR" sz="1800" dirty="0">
-              <a:latin typeface="Exo 2" pitchFamily="50" charset="0"/>
-            </a:endParaRPr>
-          </a:p>
-          <a:p>
-            <a:pPr marL="342900" indent="-342900">
-              <a:buFont typeface="Arial" panose="020B0604020202020204" pitchFamily="34" charset="0"/>
-              <a:buChar char="•"/>
-            </a:pPr>
-            <a:r>
-              <a:rPr lang="pt-BR" sz="1800" dirty="0">
-                <a:latin typeface="Exo 2" pitchFamily="50" charset="0"/>
+              <a:t>"</a:t>
+            </a:r>
+            <a:r>
+              <a:rPr lang="pt-BR" sz="2000" spc="-10" dirty="0">
+                <a:latin typeface="Arial" panose="020B0604020202020204"/>
+                <a:cs typeface="Arial" panose="020B0604020202020204"/>
               </a:rPr>
-              <a:t>Tem uma diarista de confiança mas que nem sempre consegue agenda</a:t>
-            </a:r>
-            <a:endParaRPr lang="pt-BR" sz="1800" dirty="0">
-              <a:latin typeface="Exo 2" pitchFamily="50" charset="0"/>
-            </a:endParaRPr>
-          </a:p>
-          <a:p>
-            <a:pPr marL="342900" indent="-342900">
-              <a:buFont typeface="Arial" panose="020B0604020202020204" pitchFamily="34" charset="0"/>
-              <a:buChar char="•"/>
-            </a:pPr>
-            <a:r>
-              <a:rPr lang="pt-BR" sz="1800" dirty="0">
-                <a:latin typeface="Exo 2" pitchFamily="50" charset="0"/>
+              <a:t>Ultimamente anda </a:t>
+            </a:r>
+            <a:r>
+              <a:rPr lang="pt-BR" spc="-10" dirty="0">
+                <a:latin typeface="Arial" panose="020B0604020202020204"/>
+                <a:cs typeface="Arial" panose="020B0604020202020204"/>
               </a:rPr>
-              <a:t>Não gosta de passar de roupa</a:t>
-            </a:r>
-            <a:endParaRPr lang="pt-BR" sz="1800" dirty="0">
-              <a:latin typeface="Exo 2" pitchFamily="50" charset="0"/>
-            </a:endParaRPr>
-          </a:p>
-          <a:p>
-            <a:pPr marL="342900" indent="-342900">
-              <a:buFont typeface="Arial" panose="020B0604020202020204" pitchFamily="34" charset="0"/>
-              <a:buChar char="•"/>
-            </a:pPr>
-            <a:r>
-              <a:rPr lang="pt-BR" sz="1800" dirty="0">
-                <a:latin typeface="Exo 2" pitchFamily="50" charset="0"/>
+              <a:t>muito </a:t>
+            </a:r>
+            <a:r>
+              <a:rPr lang="pt-BR" spc="-10" dirty="0">
+                <a:ea typeface="+mn-lt"/>
+                <a:cs typeface="+mn-lt"/>
               </a:rPr>
-              <a:t>Tem orçamento limitado para a atividade</a:t>
-            </a:r>
-            <a:endParaRPr lang="pt-BR" sz="1800" dirty="0">
-              <a:latin typeface="Exo 2" pitchFamily="50" charset="0"/>
-            </a:endParaRPr>
-          </a:p>
-          <a:p>
-            <a:pPr marL="342900" indent="-342900">
-              <a:buFont typeface="Arial" panose="020B0604020202020204" pitchFamily="34" charset="0"/>
-              <a:buChar char="•"/>
-            </a:pPr>
-            <a:r>
-              <a:rPr lang="pt-BR" sz="1800" dirty="0">
-                <a:latin typeface="Exo 2" pitchFamily="50" charset="0"/>
+              <a:t>difícil </a:t>
+            </a:r>
+            <a:r>
+              <a:rPr lang="pt-BR" spc="-10" dirty="0">
+                <a:latin typeface="Arial" panose="020B0604020202020204"/>
+                <a:cs typeface="Arial" panose="020B0604020202020204"/>
               </a:rPr>
-              <a:t>? Tem alguma deficiência?  Aguarde a aula sobre isso...</a:t>
-            </a:r>
-            <a:endParaRPr lang="pt-BR" sz="1800" dirty="0">
-              <a:latin typeface="Exo 2" pitchFamily="50" charset="0"/>
+              <a:t>achar </a:t>
+            </a:r>
+            <a:r>
+              <a:rPr lang="pt-BR" sz="2000" spc="-10" dirty="0">
+                <a:latin typeface="Arial" panose="020B0604020202020204"/>
+                <a:cs typeface="Arial" panose="020B0604020202020204"/>
+              </a:rPr>
+              <a:t>novos </a:t>
+            </a:r>
+            <a:r>
+              <a:rPr lang="pt-BR" spc="-10" dirty="0">
+                <a:latin typeface="Arial" panose="020B0604020202020204"/>
+                <a:cs typeface="Arial" panose="020B0604020202020204"/>
+              </a:rPr>
+              <a:t>clientes"</a:t>
+            </a:r>
+            <a:endParaRPr lang="pt-BR" spc="-10" dirty="0">
+              <a:latin typeface="Arial" panose="020B0604020202020204"/>
+              <a:cs typeface="Arial" panose="020B0604020202020204"/>
             </a:endParaRPr>
           </a:p>
         </p:txBody>
       </p:sp>
-      <p:sp>
-        <p:nvSpPr>
-          <p:cNvPr id="20" name="Espaço Reservado para Número de Slide 2"/>
-          <p:cNvSpPr txBox="1"/>
+      <p:pic>
+        <p:nvPicPr>
+          <p:cNvPr id="6" name="Imagem 16"/>
+          <p:cNvPicPr>
+            <a:picLocks noChangeAspect="1"/>
+          </p:cNvPicPr>
           <p:nvPr/>
-        </p:nvSpPr>
-        <p:spPr bwMode="auto">
+        </p:nvPicPr>
+        <p:blipFill>
+          <a:blip r:embed="rId2"/>
+          <a:stretch>
+            <a:fillRect/>
+          </a:stretch>
+        </p:blipFill>
+        <p:spPr>
           <a:xfrm>
-            <a:off x="12605478" y="7237015"/>
-            <a:ext cx="628646" cy="214290"/>
+            <a:off x="1037393" y="2097852"/>
+            <a:ext cx="2700701" cy="2033113"/>
           </a:xfrm>
           <a:prstGeom prst="rect">
             <a:avLst/>
           </a:prstGeom>
-          <a:noFill/>
-          <a:ln w="9525">
-            <a:noFill/>
-            <a:miter lim="800000"/>
-          </a:ln>
-          <a:effectLst/>
-        </p:spPr>
-        <p:txBody>
-          <a:bodyPr vert="horz" wrap="square" lIns="18000" tIns="10800" rIns="18000" bIns="10800" numCol="1" anchor="t" anchorCtr="0" compatLnSpc="1"/>
-          <a:lstStyle>
-            <a:defPPr>
-              <a:defRPr lang="pt-BR"/>
-            </a:defPPr>
-            <a:lvl1pPr marL="0" algn="r" defTabSz="1043305" rtl="0" eaLnBrk="1" latinLnBrk="0" hangingPunct="1">
-              <a:spcBef>
-                <a:spcPct val="0"/>
-              </a:spcBef>
-              <a:spcAft>
-                <a:spcPct val="0"/>
-              </a:spcAft>
-              <a:defRPr sz="1255" b="1" kern="1200">
-                <a:solidFill>
-                  <a:schemeClr val="bg1"/>
-                </a:solidFill>
-                <a:latin typeface="Exo 2" pitchFamily="50" charset="0"/>
-                <a:ea typeface="Tahoma" pitchFamily="34" charset="0"/>
-                <a:cs typeface="Tahoma" pitchFamily="34" charset="0"/>
-              </a:defRPr>
-            </a:lvl1pPr>
-            <a:lvl2pPr marL="521335" algn="l" defTabSz="1043305" rtl="0" eaLnBrk="1" latinLnBrk="0" hangingPunct="1">
-              <a:defRPr sz="2100" kern="1200">
-                <a:solidFill>
-                  <a:schemeClr val="tx1"/>
-                </a:solidFill>
-                <a:latin typeface="+mn-lt"/>
-                <a:ea typeface="+mn-ea"/>
-                <a:cs typeface="+mn-cs"/>
-              </a:defRPr>
-            </a:lvl2pPr>
-            <a:lvl3pPr marL="1043305" algn="l" defTabSz="1043305" rtl="0" eaLnBrk="1" latinLnBrk="0" hangingPunct="1">
-              <a:defRPr sz="2100" kern="1200">
-                <a:solidFill>
-                  <a:schemeClr val="tx1"/>
-                </a:solidFill>
-                <a:latin typeface="+mn-lt"/>
-                <a:ea typeface="+mn-ea"/>
-                <a:cs typeface="+mn-cs"/>
-              </a:defRPr>
-            </a:lvl3pPr>
-            <a:lvl4pPr marL="1564640" algn="l" defTabSz="1043305" rtl="0" eaLnBrk="1" latinLnBrk="0" hangingPunct="1">
-              <a:defRPr sz="2100" kern="1200">
-                <a:solidFill>
-                  <a:schemeClr val="tx1"/>
-                </a:solidFill>
-                <a:latin typeface="+mn-lt"/>
-                <a:ea typeface="+mn-ea"/>
-                <a:cs typeface="+mn-cs"/>
-              </a:defRPr>
-            </a:lvl4pPr>
-            <a:lvl5pPr marL="2085975" algn="l" defTabSz="1043305" rtl="0" eaLnBrk="1" latinLnBrk="0" hangingPunct="1">
-              <a:defRPr sz="2100" kern="1200">
-                <a:solidFill>
-                  <a:schemeClr val="tx1"/>
-                </a:solidFill>
-                <a:latin typeface="+mn-lt"/>
-                <a:ea typeface="+mn-ea"/>
-                <a:cs typeface="+mn-cs"/>
-              </a:defRPr>
-            </a:lvl5pPr>
-            <a:lvl6pPr marL="2607945" algn="l" defTabSz="1043305" rtl="0" eaLnBrk="1" latinLnBrk="0" hangingPunct="1">
-              <a:defRPr sz="2100" kern="1200">
-                <a:solidFill>
-                  <a:schemeClr val="tx1"/>
-                </a:solidFill>
-                <a:latin typeface="+mn-lt"/>
-                <a:ea typeface="+mn-ea"/>
-                <a:cs typeface="+mn-cs"/>
-              </a:defRPr>
-            </a:lvl6pPr>
-            <a:lvl7pPr marL="3129280" algn="l" defTabSz="1043305" rtl="0" eaLnBrk="1" latinLnBrk="0" hangingPunct="1">
-              <a:defRPr sz="2100" kern="1200">
-                <a:solidFill>
-                  <a:schemeClr val="tx1"/>
-                </a:solidFill>
-                <a:latin typeface="+mn-lt"/>
-                <a:ea typeface="+mn-ea"/>
-                <a:cs typeface="+mn-cs"/>
-              </a:defRPr>
-            </a:lvl7pPr>
-            <a:lvl8pPr marL="3650615" algn="l" defTabSz="1043305" rtl="0" eaLnBrk="1" latinLnBrk="0" hangingPunct="1">
-              <a:defRPr sz="2100" kern="1200">
-                <a:solidFill>
-                  <a:schemeClr val="tx1"/>
-                </a:solidFill>
-                <a:latin typeface="+mn-lt"/>
-                <a:ea typeface="+mn-ea"/>
-                <a:cs typeface="+mn-cs"/>
-              </a:defRPr>
-            </a:lvl8pPr>
-            <a:lvl9pPr marL="4171950" algn="l" defTabSz="1043305" rtl="0" eaLnBrk="1" latinLnBrk="0" hangingPunct="1">
-              <a:defRPr sz="2100" kern="1200">
-                <a:solidFill>
-                  <a:schemeClr val="tx1"/>
-                </a:solidFill>
-                <a:latin typeface="+mn-lt"/>
-                <a:ea typeface="+mn-ea"/>
-                <a:cs typeface="+mn-cs"/>
-              </a:defRPr>
-            </a:lvl9pPr>
-          </a:lstStyle>
-          <a:p>
-            <a:pPr>
-              <a:defRPr/>
-            </a:pPr>
-            <a:r>
-              <a:rPr lang="pt-BR"/>
-              <a:t>1</a:t>
-            </a:r>
-            <a:endParaRPr lang="pt-BR" sz="880"/>
-          </a:p>
-        </p:txBody>
-      </p:sp>
-      <p:pic>
-        <p:nvPicPr>
-          <p:cNvPr id="23" name="Picture 2" descr="Menina Foto gratuita"/>
-          <p:cNvPicPr>
-            <a:picLocks noChangeAspect="1" noChangeArrowheads="1"/>
-          </p:cNvPicPr>
-          <p:nvPr/>
-        </p:nvPicPr>
-        <p:blipFill rotWithShape="1">
-          <a:blip r:embed="rId1" cstate="email"/>
-          <a:srcRect/>
-          <a:stretch>
-            <a:fillRect/>
-          </a:stretch>
-        </p:blipFill>
-        <p:spPr bwMode="auto">
-          <a:xfrm>
-            <a:off x="1052612" y="1869264"/>
-            <a:ext cx="1720043" cy="2149814"/>
-          </a:xfrm>
-          <a:prstGeom prst="rect">
-            <a:avLst/>
-          </a:prstGeom>
-          <a:noFill/>
-          <a:extLst>
-            <a:ext uri="{909E8E84-426E-40DD-AFC4-6F175D3DCCD1}">
-              <a14:hiddenFill xmlns:a14="http://schemas.microsoft.com/office/drawing/2010/main">
-                <a:solidFill>
-                  <a:srgbClr val="FFFFFF"/>
-                </a:solidFill>
-              </a14:hiddenFill>
-            </a:ext>
-          </a:extLst>
         </p:spPr>
       </p:pic>
     </p:spTree>

</xml_diff>